<commit_message>
Final Version of the PPT for the first presentation
Final Version of the PPT for the first presentation
</commit_message>
<xml_diff>
--- a/HTML Attribute Analysis of the Top 200 Most.pptx
+++ b/HTML Attribute Analysis of the Top 200 Most.pptx
@@ -5,15 +5,17 @@
     <p:sldMasterId id="2147483648" r:id="rId1"/>
   </p:sldMasterIdLst>
   <p:notesMasterIdLst>
-    <p:notesMasterId r:id="rId8"/>
+    <p:notesMasterId r:id="rId10"/>
   </p:notesMasterIdLst>
   <p:sldIdLst>
     <p:sldId id="256" r:id="rId2"/>
     <p:sldId id="257" r:id="rId3"/>
     <p:sldId id="258" r:id="rId4"/>
     <p:sldId id="260" r:id="rId5"/>
-    <p:sldId id="259" r:id="rId6"/>
-    <p:sldId id="261" r:id="rId7"/>
+    <p:sldId id="262" r:id="rId6"/>
+    <p:sldId id="259" r:id="rId7"/>
+    <p:sldId id="261" r:id="rId8"/>
+    <p:sldId id="263" r:id="rId9"/>
   </p:sldIdLst>
   <p:sldSz cx="9144000" cy="6858000" type="screen4x3"/>
   <p:notesSz cx="6858000" cy="9144000"/>
@@ -197,7 +199,8 @@
           <a:p>
             <a:fld id="{264AC972-6A8E-4376-848F-959978D17A7E}" type="datetimeFigureOut">
               <a:rPr lang="en-US" smtClean="0"/>
-              <a:t>8/31/2016</a:t>
+              <a:pPr/>
+              <a:t>9/1/2016</a:t>
             </a:fld>
             <a:endParaRPr lang="en-IN"/>
           </a:p>
@@ -358,6 +361,7 @@
           <a:p>
             <a:fld id="{0DC71F53-CA19-4E4B-BB62-BFDB39AE29EB}" type="slidenum">
               <a:rPr lang="en-IN" smtClean="0"/>
+              <a:pPr/>
               <a:t>‹#›</a:t>
             </a:fld>
             <a:endParaRPr lang="en-IN"/>
@@ -529,6 +533,7 @@
           <a:p>
             <a:fld id="{0DC71F53-CA19-4E4B-BB62-BFDB39AE29EB}" type="slidenum">
               <a:rPr lang="en-IN" smtClean="0"/>
+              <a:pPr/>
               <a:t>1</a:t>
             </a:fld>
             <a:endParaRPr lang="en-IN"/>
@@ -724,7 +729,8 @@
           <a:p>
             <a:fld id="{21404568-4102-4B7C-8E40-79977C8272D7}" type="datetimeFigureOut">
               <a:rPr lang="en-US" smtClean="0"/>
-              <a:t>8/31/2016</a:t>
+              <a:pPr/>
+              <a:t>9/1/2016</a:t>
             </a:fld>
             <a:endParaRPr lang="en-IN"/>
           </a:p>
@@ -766,6 +772,7 @@
           <a:p>
             <a:fld id="{EF8286A6-7DDA-42B6-8FAC-54D0814FD1B9}" type="slidenum">
               <a:rPr lang="en-IN" smtClean="0"/>
+              <a:pPr/>
               <a:t>‹#›</a:t>
             </a:fld>
             <a:endParaRPr lang="en-IN"/>
@@ -889,7 +896,8 @@
           <a:p>
             <a:fld id="{21404568-4102-4B7C-8E40-79977C8272D7}" type="datetimeFigureOut">
               <a:rPr lang="en-US" smtClean="0"/>
-              <a:t>8/31/2016</a:t>
+              <a:pPr/>
+              <a:t>9/1/2016</a:t>
             </a:fld>
             <a:endParaRPr lang="en-IN"/>
           </a:p>
@@ -931,6 +939,7 @@
           <a:p>
             <a:fld id="{EF8286A6-7DDA-42B6-8FAC-54D0814FD1B9}" type="slidenum">
               <a:rPr lang="en-IN" smtClean="0"/>
+              <a:pPr/>
               <a:t>‹#›</a:t>
             </a:fld>
             <a:endParaRPr lang="en-IN"/>
@@ -1064,7 +1073,8 @@
           <a:p>
             <a:fld id="{21404568-4102-4B7C-8E40-79977C8272D7}" type="datetimeFigureOut">
               <a:rPr lang="en-US" smtClean="0"/>
-              <a:t>8/31/2016</a:t>
+              <a:pPr/>
+              <a:t>9/1/2016</a:t>
             </a:fld>
             <a:endParaRPr lang="en-IN"/>
           </a:p>
@@ -1106,6 +1116,7 @@
           <a:p>
             <a:fld id="{EF8286A6-7DDA-42B6-8FAC-54D0814FD1B9}" type="slidenum">
               <a:rPr lang="en-IN" smtClean="0"/>
+              <a:pPr/>
               <a:t>‹#›</a:t>
             </a:fld>
             <a:endParaRPr lang="en-IN"/>
@@ -1229,7 +1240,8 @@
           <a:p>
             <a:fld id="{21404568-4102-4B7C-8E40-79977C8272D7}" type="datetimeFigureOut">
               <a:rPr lang="en-US" smtClean="0"/>
-              <a:t>8/31/2016</a:t>
+              <a:pPr/>
+              <a:t>9/1/2016</a:t>
             </a:fld>
             <a:endParaRPr lang="en-IN"/>
           </a:p>
@@ -1271,6 +1283,7 @@
           <a:p>
             <a:fld id="{EF8286A6-7DDA-42B6-8FAC-54D0814FD1B9}" type="slidenum">
               <a:rPr lang="en-IN" smtClean="0"/>
+              <a:pPr/>
               <a:t>‹#›</a:t>
             </a:fld>
             <a:endParaRPr lang="en-IN"/>
@@ -1470,7 +1483,8 @@
           <a:p>
             <a:fld id="{21404568-4102-4B7C-8E40-79977C8272D7}" type="datetimeFigureOut">
               <a:rPr lang="en-US" smtClean="0"/>
-              <a:t>8/31/2016</a:t>
+              <a:pPr/>
+              <a:t>9/1/2016</a:t>
             </a:fld>
             <a:endParaRPr lang="en-IN"/>
           </a:p>
@@ -1512,6 +1526,7 @@
           <a:p>
             <a:fld id="{EF8286A6-7DDA-42B6-8FAC-54D0814FD1B9}" type="slidenum">
               <a:rPr lang="en-IN" smtClean="0"/>
+              <a:pPr/>
               <a:t>‹#›</a:t>
             </a:fld>
             <a:endParaRPr lang="en-IN"/>
@@ -1753,7 +1768,8 @@
           <a:p>
             <a:fld id="{21404568-4102-4B7C-8E40-79977C8272D7}" type="datetimeFigureOut">
               <a:rPr lang="en-US" smtClean="0"/>
-              <a:t>8/31/2016</a:t>
+              <a:pPr/>
+              <a:t>9/1/2016</a:t>
             </a:fld>
             <a:endParaRPr lang="en-IN"/>
           </a:p>
@@ -1795,6 +1811,7 @@
           <a:p>
             <a:fld id="{EF8286A6-7DDA-42B6-8FAC-54D0814FD1B9}" type="slidenum">
               <a:rPr lang="en-IN" smtClean="0"/>
+              <a:pPr/>
               <a:t>‹#›</a:t>
             </a:fld>
             <a:endParaRPr lang="en-IN"/>
@@ -2170,7 +2187,8 @@
           <a:p>
             <a:fld id="{21404568-4102-4B7C-8E40-79977C8272D7}" type="datetimeFigureOut">
               <a:rPr lang="en-US" smtClean="0"/>
-              <a:t>8/31/2016</a:t>
+              <a:pPr/>
+              <a:t>9/1/2016</a:t>
             </a:fld>
             <a:endParaRPr lang="en-IN"/>
           </a:p>
@@ -2212,6 +2230,7 @@
           <a:p>
             <a:fld id="{EF8286A6-7DDA-42B6-8FAC-54D0814FD1B9}" type="slidenum">
               <a:rPr lang="en-IN" smtClean="0"/>
+              <a:pPr/>
               <a:t>‹#›</a:t>
             </a:fld>
             <a:endParaRPr lang="en-IN"/>
@@ -2283,7 +2302,8 @@
           <a:p>
             <a:fld id="{21404568-4102-4B7C-8E40-79977C8272D7}" type="datetimeFigureOut">
               <a:rPr lang="en-US" smtClean="0"/>
-              <a:t>8/31/2016</a:t>
+              <a:pPr/>
+              <a:t>9/1/2016</a:t>
             </a:fld>
             <a:endParaRPr lang="en-IN"/>
           </a:p>
@@ -2325,6 +2345,7 @@
           <a:p>
             <a:fld id="{EF8286A6-7DDA-42B6-8FAC-54D0814FD1B9}" type="slidenum">
               <a:rPr lang="en-IN" smtClean="0"/>
+              <a:pPr/>
               <a:t>‹#›</a:t>
             </a:fld>
             <a:endParaRPr lang="en-IN"/>
@@ -2373,7 +2394,8 @@
           <a:p>
             <a:fld id="{21404568-4102-4B7C-8E40-79977C8272D7}" type="datetimeFigureOut">
               <a:rPr lang="en-US" smtClean="0"/>
-              <a:t>8/31/2016</a:t>
+              <a:pPr/>
+              <a:t>9/1/2016</a:t>
             </a:fld>
             <a:endParaRPr lang="en-IN"/>
           </a:p>
@@ -2415,6 +2437,7 @@
           <a:p>
             <a:fld id="{EF8286A6-7DDA-42B6-8FAC-54D0814FD1B9}" type="slidenum">
               <a:rPr lang="en-IN" smtClean="0"/>
+              <a:pPr/>
               <a:t>‹#›</a:t>
             </a:fld>
             <a:endParaRPr lang="en-IN"/>
@@ -2645,7 +2668,8 @@
           <a:p>
             <a:fld id="{21404568-4102-4B7C-8E40-79977C8272D7}" type="datetimeFigureOut">
               <a:rPr lang="en-US" smtClean="0"/>
-              <a:t>8/31/2016</a:t>
+              <a:pPr/>
+              <a:t>9/1/2016</a:t>
             </a:fld>
             <a:endParaRPr lang="en-IN"/>
           </a:p>
@@ -2687,6 +2711,7 @@
           <a:p>
             <a:fld id="{EF8286A6-7DDA-42B6-8FAC-54D0814FD1B9}" type="slidenum">
               <a:rPr lang="en-IN" smtClean="0"/>
+              <a:pPr/>
               <a:t>‹#›</a:t>
             </a:fld>
             <a:endParaRPr lang="en-IN"/>
@@ -2893,7 +2918,8 @@
           <a:p>
             <a:fld id="{21404568-4102-4B7C-8E40-79977C8272D7}" type="datetimeFigureOut">
               <a:rPr lang="en-US" smtClean="0"/>
-              <a:t>8/31/2016</a:t>
+              <a:pPr/>
+              <a:t>9/1/2016</a:t>
             </a:fld>
             <a:endParaRPr lang="en-IN"/>
           </a:p>
@@ -2935,6 +2961,7 @@
           <a:p>
             <a:fld id="{EF8286A6-7DDA-42B6-8FAC-54D0814FD1B9}" type="slidenum">
               <a:rPr lang="en-IN" smtClean="0"/>
+              <a:pPr/>
               <a:t>‹#›</a:t>
             </a:fld>
             <a:endParaRPr lang="en-IN"/>
@@ -3108,7 +3135,8 @@
           <a:p>
             <a:fld id="{21404568-4102-4B7C-8E40-79977C8272D7}" type="datetimeFigureOut">
               <a:rPr lang="en-US" smtClean="0"/>
-              <a:t>8/31/2016</a:t>
+              <a:pPr/>
+              <a:t>9/1/2016</a:t>
             </a:fld>
             <a:endParaRPr lang="en-IN"/>
           </a:p>
@@ -3186,6 +3214,7 @@
           <a:p>
             <a:fld id="{EF8286A6-7DDA-42B6-8FAC-54D0814FD1B9}" type="slidenum">
               <a:rPr lang="en-IN" smtClean="0"/>
+              <a:pPr/>
               <a:t>‹#›</a:t>
             </a:fld>
             <a:endParaRPr lang="en-IN"/>
@@ -3490,9 +3519,37 @@
         </p:nvSpPr>
         <p:spPr>
           <a:xfrm>
-            <a:off x="685800" y="1428736"/>
-            <a:ext cx="7772400" cy="3071833"/>
+            <a:off x="785786" y="1357299"/>
+            <a:ext cx="7772400" cy="2143140"/>
           </a:xfrm>
+          <a:ln w="95250">
+            <a:gradFill>
+              <a:gsLst>
+                <a:gs pos="0">
+                  <a:srgbClr val="3399FF"/>
+                </a:gs>
+                <a:gs pos="16000">
+                  <a:srgbClr val="00CCCC"/>
+                </a:gs>
+                <a:gs pos="47000">
+                  <a:srgbClr val="9999FF"/>
+                </a:gs>
+                <a:gs pos="60001">
+                  <a:srgbClr val="2E6792"/>
+                </a:gs>
+                <a:gs pos="71001">
+                  <a:srgbClr val="3333CC"/>
+                </a:gs>
+                <a:gs pos="81000">
+                  <a:srgbClr val="1170FF"/>
+                </a:gs>
+                <a:gs pos="100000">
+                  <a:srgbClr val="006699"/>
+                </a:gs>
+              </a:gsLst>
+              <a:lin ang="5400000" scaled="0"/>
+            </a:gradFill>
+          </a:ln>
         </p:spPr>
         <p:txBody>
           <a:bodyPr>
@@ -3502,33 +3559,151 @@
           <a:p>
             <a:r>
               <a:rPr lang="en-US" dirty="0" smtClean="0"/>
-              <a:t>HTML Attribute Analysis of the Top 200 Most visited websites in India.</a:t>
+              <a:t>Efficiency Analysis </a:t>
+            </a:r>
+            <a:r>
+              <a:rPr lang="en-US" dirty="0" smtClean="0"/>
+              <a:t>of the Top 200 Most visited websites in India.</a:t>
             </a:r>
             <a:endParaRPr lang="en-IN" dirty="0"/>
+          </a:p>
+        </p:txBody>
+      </p:sp>
+      <p:pic>
+        <p:nvPicPr>
+          <p:cNvPr id="4" name="Picture 3" descr="800px-Manipal_University_Logo.svg.png"/>
+          <p:cNvPicPr>
+            <a:picLocks noChangeAspect="1"/>
+          </p:cNvPicPr>
+          <p:nvPr/>
+        </p:nvPicPr>
+        <p:blipFill>
+          <a:blip r:embed="rId3"/>
+          <a:stretch>
+            <a:fillRect/>
+          </a:stretch>
+        </p:blipFill>
+        <p:spPr>
+          <a:xfrm>
+            <a:off x="142844" y="5643578"/>
+            <a:ext cx="3309934" cy="1038492"/>
+          </a:xfrm>
+          <a:prstGeom prst="rect">
+            <a:avLst/>
+          </a:prstGeom>
+        </p:spPr>
+      </p:pic>
+      <p:pic>
+        <p:nvPicPr>
+          <p:cNvPr id="5" name="Picture 4" descr="sois.png"/>
+          <p:cNvPicPr>
+            <a:picLocks noChangeAspect="1"/>
+          </p:cNvPicPr>
+          <p:nvPr/>
+        </p:nvPicPr>
+        <p:blipFill>
+          <a:blip r:embed="rId4"/>
+          <a:stretch>
+            <a:fillRect/>
+          </a:stretch>
+        </p:blipFill>
+        <p:spPr>
+          <a:xfrm>
+            <a:off x="1500166" y="6429396"/>
+            <a:ext cx="1714416" cy="428604"/>
+          </a:xfrm>
+          <a:prstGeom prst="rect">
+            <a:avLst/>
+          </a:prstGeom>
+        </p:spPr>
+      </p:pic>
+      <p:sp>
+        <p:nvSpPr>
+          <p:cNvPr id="6" name="TextBox 5"/>
+          <p:cNvSpPr txBox="1"/>
+          <p:nvPr/>
+        </p:nvSpPr>
+        <p:spPr>
+          <a:xfrm>
+            <a:off x="714348" y="4214818"/>
+            <a:ext cx="3214710" cy="923330"/>
+          </a:xfrm>
+          <a:prstGeom prst="rect">
+            <a:avLst/>
+          </a:prstGeom>
+          <a:noFill/>
+        </p:spPr>
+        <p:txBody>
+          <a:bodyPr wrap="square" rtlCol="0">
+            <a:spAutoFit/>
+          </a:bodyPr>
+          <a:lstStyle/>
+          <a:p>
+            <a:pPr algn="ctr"/>
+            <a:r>
+              <a:rPr lang="en-US" b="1" dirty="0" smtClean="0"/>
+              <a:t>Manick Mehra</a:t>
+            </a:r>
+          </a:p>
+          <a:p>
+            <a:pPr algn="ctr"/>
+            <a:r>
+              <a:rPr lang="en-US" b="1" dirty="0" smtClean="0"/>
+              <a:t>Semester 1</a:t>
+            </a:r>
+          </a:p>
+          <a:p>
+            <a:pPr algn="ctr"/>
+            <a:r>
+              <a:rPr lang="en-US" b="1" dirty="0" smtClean="0"/>
+              <a:t>Big Data &amp; Data Visualization</a:t>
+            </a:r>
+            <a:endParaRPr lang="en-IN" b="1" dirty="0"/>
           </a:p>
         </p:txBody>
       </p:sp>
       <p:sp>
         <p:nvSpPr>
-          <p:cNvPr id="3" name="Subtitle 2"/>
-          <p:cNvSpPr>
-            <a:spLocks noGrp="1"/>
-          </p:cNvSpPr>
-          <p:nvPr>
-            <p:ph type="subTitle" idx="1"/>
-          </p:nvPr>
+          <p:cNvPr id="7" name="TextBox 6"/>
+          <p:cNvSpPr txBox="1"/>
+          <p:nvPr/>
         </p:nvSpPr>
         <p:spPr>
           <a:xfrm>
-            <a:off x="1428728" y="4429132"/>
-            <a:ext cx="6400800" cy="1752600"/>
+            <a:off x="4714876" y="4214818"/>
+            <a:ext cx="3214710" cy="923330"/>
           </a:xfrm>
+          <a:prstGeom prst="rect">
+            <a:avLst/>
+          </a:prstGeom>
+          <a:noFill/>
         </p:spPr>
         <p:txBody>
-          <a:bodyPr/>
+          <a:bodyPr wrap="square" rtlCol="0">
+            <a:spAutoFit/>
+          </a:bodyPr>
           <a:lstStyle/>
           <a:p>
-            <a:endParaRPr lang="en-IN" dirty="0"/>
+            <a:pPr algn="ctr"/>
+            <a:r>
+              <a:rPr lang="en-US" b="1" dirty="0" smtClean="0"/>
+              <a:t>Hartej Kathuria</a:t>
+            </a:r>
+          </a:p>
+          <a:p>
+            <a:pPr algn="ctr"/>
+            <a:r>
+              <a:rPr lang="en-US" b="1" dirty="0" smtClean="0"/>
+              <a:t>Semester 1</a:t>
+            </a:r>
+          </a:p>
+          <a:p>
+            <a:pPr algn="ctr"/>
+            <a:r>
+              <a:rPr lang="en-US" b="1" dirty="0" smtClean="0"/>
+              <a:t>Big Data &amp; Data Visualization</a:t>
+            </a:r>
+            <a:endParaRPr lang="en-IN" b="1" dirty="0"/>
           </a:p>
         </p:txBody>
       </p:sp>
@@ -3599,14 +3774,103 @@
         </p:nvSpPr>
         <p:spPr/>
         <p:txBody>
-          <a:bodyPr/>
+          <a:bodyPr>
+            <a:normAutofit fontScale="85000" lnSpcReduction="20000"/>
+          </a:bodyPr>
           <a:lstStyle/>
           <a:p>
             <a:r>
               <a:rPr lang="en-US" dirty="0" smtClean="0"/>
-              <a:t>To provide a detail visualization of the various HTML attributes used by the most visited websites in our country.</a:t>
-            </a:r>
-            <a:endParaRPr lang="en-IN" dirty="0"/>
+              <a:t>To provide a detail visualization of </a:t>
+            </a:r>
+            <a:r>
+              <a:rPr lang="en-US" dirty="0" smtClean="0"/>
+              <a:t>how technically efficient are the top 200 web sites in India.</a:t>
+            </a:r>
+          </a:p>
+          <a:p>
+            <a:r>
+              <a:rPr lang="en-US" dirty="0" smtClean="0"/>
+              <a:t>This is based on various factors that determine the efficiency of the website like.</a:t>
+            </a:r>
+          </a:p>
+          <a:p>
+            <a:pPr lvl="1"/>
+            <a:r>
+              <a:rPr lang="en-IN" dirty="0" smtClean="0"/>
+              <a:t>THE NUMBER OF INLINE </a:t>
+            </a:r>
+            <a:r>
+              <a:rPr lang="en-IN" dirty="0" smtClean="0"/>
+              <a:t>SCRIPTS</a:t>
+            </a:r>
+          </a:p>
+          <a:p>
+            <a:pPr lvl="1"/>
+            <a:r>
+              <a:rPr lang="en-US" dirty="0" smtClean="0"/>
+              <a:t>PAGE WEIGHT</a:t>
+            </a:r>
+          </a:p>
+          <a:p>
+            <a:pPr lvl="2"/>
+            <a:r>
+              <a:rPr lang="en-IN" dirty="0" smtClean="0"/>
+              <a:t>Elimination </a:t>
+            </a:r>
+            <a:r>
+              <a:rPr lang="en-IN" dirty="0" smtClean="0"/>
+              <a:t>of unnecessary whitespace and </a:t>
+            </a:r>
+            <a:r>
+              <a:rPr lang="en-IN" dirty="0" smtClean="0"/>
+              <a:t>comments</a:t>
+            </a:r>
+          </a:p>
+          <a:p>
+            <a:pPr lvl="2"/>
+            <a:r>
+              <a:rPr lang="en-US" dirty="0" smtClean="0"/>
+              <a:t>Placement of inline scripts/CSS.</a:t>
+            </a:r>
+          </a:p>
+          <a:p>
+            <a:pPr lvl="2"/>
+            <a:r>
+              <a:rPr lang="en-US" dirty="0" smtClean="0"/>
+              <a:t>Number of files on the page</a:t>
+            </a:r>
+          </a:p>
+          <a:p>
+            <a:pPr lvl="2"/>
+            <a:r>
+              <a:rPr lang="en-US" dirty="0" smtClean="0"/>
+              <a:t>Size of the Website</a:t>
+            </a:r>
+          </a:p>
+          <a:p>
+            <a:pPr lvl="2"/>
+            <a:r>
+              <a:rPr lang="en-US" dirty="0" err="1" smtClean="0"/>
+              <a:t>Async</a:t>
+            </a:r>
+            <a:r>
+              <a:rPr lang="en-US" dirty="0" smtClean="0"/>
+              <a:t> and defers used in </a:t>
+            </a:r>
+            <a:r>
+              <a:rPr lang="en-US" dirty="0" err="1" smtClean="0"/>
+              <a:t>Javascripts</a:t>
+            </a:r>
+            <a:endParaRPr lang="en-IN" dirty="0" smtClean="0"/>
+          </a:p>
+          <a:p>
+            <a:pPr lvl="1"/>
+            <a:r>
+              <a:rPr lang="en-US" dirty="0" smtClean="0"/>
+              <a:t>CACHING</a:t>
+            </a:r>
+            <a:endParaRPr lang="en-US" dirty="0" smtClean="0"/>
           </a:p>
         </p:txBody>
       </p:sp>
@@ -3652,11 +3916,17 @@
             <p:ph type="title"/>
           </p:nvPr>
         </p:nvSpPr>
-        <p:spPr/>
+        <p:spPr>
+          <a:xfrm>
+            <a:off x="428596" y="0"/>
+            <a:ext cx="8229600" cy="1143000"/>
+          </a:xfrm>
+        </p:spPr>
         <p:txBody>
           <a:bodyPr/>
           <a:lstStyle/>
           <a:p>
+            <a:pPr algn="l"/>
             <a:r>
               <a:rPr lang="en-US" dirty="0" smtClean="0"/>
               <a:t>Proposed Solution</a:t>
@@ -3675,43 +3945,788 @@
             <p:ph idx="1"/>
           </p:nvPr>
         </p:nvSpPr>
-        <p:spPr/>
+        <p:spPr>
+          <a:xfrm>
+            <a:off x="428596" y="1214422"/>
+            <a:ext cx="8229600" cy="785818"/>
+          </a:xfrm>
+        </p:spPr>
         <p:txBody>
-          <a:bodyPr/>
+          <a:bodyPr>
+            <a:normAutofit lnSpcReduction="10000"/>
+          </a:bodyPr>
           <a:lstStyle/>
           <a:p>
             <a:r>
-              <a:rPr lang="en-US" dirty="0" smtClean="0"/>
-              <a:t>The entire problem statement will be divided into sub tasks which would include</a:t>
-            </a:r>
-          </a:p>
+              <a:rPr lang="en-US" sz="2400" dirty="0" smtClean="0"/>
+              <a:t>The entire problem statement will be divided into sub tasks which would </a:t>
+            </a:r>
+            <a:r>
+              <a:rPr lang="en-US" sz="2400" dirty="0" smtClean="0"/>
+              <a:t>include</a:t>
+            </a:r>
+            <a:endParaRPr lang="en-US" sz="2400" dirty="0" smtClean="0"/>
+          </a:p>
+        </p:txBody>
+      </p:sp>
+      <p:sp>
+        <p:nvSpPr>
+          <p:cNvPr id="4" name="Oval 3"/>
+          <p:cNvSpPr/>
+          <p:nvPr/>
+        </p:nvSpPr>
+        <p:spPr>
+          <a:xfrm>
+            <a:off x="3071802" y="3857628"/>
+            <a:ext cx="500066" cy="2357454"/>
+          </a:xfrm>
+          <a:prstGeom prst="ellipse">
+            <a:avLst/>
+          </a:prstGeom>
+          <a:gradFill>
+            <a:gsLst>
+              <a:gs pos="0">
+                <a:schemeClr val="accent1">
+                  <a:tint val="66000"/>
+                  <a:satMod val="160000"/>
+                </a:schemeClr>
+              </a:gs>
+              <a:gs pos="50000">
+                <a:schemeClr val="accent1">
+                  <a:tint val="44500"/>
+                  <a:satMod val="160000"/>
+                </a:schemeClr>
+              </a:gs>
+              <a:gs pos="100000">
+                <a:schemeClr val="accent1">
+                  <a:tint val="23500"/>
+                  <a:satMod val="160000"/>
+                </a:schemeClr>
+              </a:gs>
+            </a:gsLst>
+            <a:lin ang="5400000" scaled="0"/>
+          </a:gradFill>
+        </p:spPr>
+        <p:style>
+          <a:lnRef idx="2">
+            <a:schemeClr val="accent1">
+              <a:shade val="50000"/>
+            </a:schemeClr>
+          </a:lnRef>
+          <a:fillRef idx="1">
+            <a:schemeClr val="accent1"/>
+          </a:fillRef>
+          <a:effectRef idx="0">
+            <a:schemeClr val="accent1"/>
+          </a:effectRef>
+          <a:fontRef idx="minor">
+            <a:schemeClr val="lt1"/>
+          </a:fontRef>
+        </p:style>
+        <p:txBody>
+          <a:bodyPr rtlCol="0" anchor="ctr"/>
+          <a:lstStyle/>
+          <a:p>
+            <a:pPr algn="ctr"/>
+            <a:endParaRPr lang="en-IN"/>
+          </a:p>
+        </p:txBody>
+      </p:sp>
+      <p:sp>
+        <p:nvSpPr>
+          <p:cNvPr id="7" name="Oval 6"/>
+          <p:cNvSpPr/>
+          <p:nvPr/>
+        </p:nvSpPr>
+        <p:spPr>
+          <a:xfrm>
+            <a:off x="4857752" y="3857628"/>
+            <a:ext cx="500066" cy="2357454"/>
+          </a:xfrm>
+          <a:prstGeom prst="ellipse">
+            <a:avLst/>
+          </a:prstGeom>
+          <a:gradFill>
+            <a:gsLst>
+              <a:gs pos="0">
+                <a:schemeClr val="accent1">
+                  <a:tint val="66000"/>
+                  <a:satMod val="160000"/>
+                </a:schemeClr>
+              </a:gs>
+              <a:gs pos="50000">
+                <a:schemeClr val="accent1">
+                  <a:tint val="44500"/>
+                  <a:satMod val="160000"/>
+                </a:schemeClr>
+              </a:gs>
+              <a:gs pos="100000">
+                <a:schemeClr val="accent1">
+                  <a:tint val="23500"/>
+                  <a:satMod val="160000"/>
+                </a:schemeClr>
+              </a:gs>
+            </a:gsLst>
+            <a:lin ang="5400000" scaled="0"/>
+          </a:gradFill>
+        </p:spPr>
+        <p:style>
+          <a:lnRef idx="2">
+            <a:schemeClr val="accent1">
+              <a:shade val="50000"/>
+            </a:schemeClr>
+          </a:lnRef>
+          <a:fillRef idx="1">
+            <a:schemeClr val="accent1"/>
+          </a:fillRef>
+          <a:effectRef idx="0">
+            <a:schemeClr val="accent1"/>
+          </a:effectRef>
+          <a:fontRef idx="minor">
+            <a:schemeClr val="lt1"/>
+          </a:fontRef>
+        </p:style>
+        <p:txBody>
+          <a:bodyPr rtlCol="0" anchor="ctr"/>
+          <a:lstStyle/>
+          <a:p>
+            <a:pPr algn="ctr"/>
+            <a:endParaRPr lang="en-IN"/>
+          </a:p>
+        </p:txBody>
+      </p:sp>
+      <p:sp>
+        <p:nvSpPr>
+          <p:cNvPr id="8" name="Oval 7"/>
+          <p:cNvSpPr/>
+          <p:nvPr/>
+        </p:nvSpPr>
+        <p:spPr>
+          <a:xfrm>
+            <a:off x="6572264" y="3857628"/>
+            <a:ext cx="928694" cy="2357454"/>
+          </a:xfrm>
+          <a:prstGeom prst="ellipse">
+            <a:avLst/>
+          </a:prstGeom>
+          <a:gradFill>
+            <a:gsLst>
+              <a:gs pos="0">
+                <a:schemeClr val="accent1">
+                  <a:tint val="66000"/>
+                  <a:satMod val="160000"/>
+                </a:schemeClr>
+              </a:gs>
+              <a:gs pos="50000">
+                <a:schemeClr val="accent1">
+                  <a:tint val="44500"/>
+                  <a:satMod val="160000"/>
+                </a:schemeClr>
+              </a:gs>
+              <a:gs pos="100000">
+                <a:schemeClr val="accent1">
+                  <a:tint val="23500"/>
+                  <a:satMod val="160000"/>
+                </a:schemeClr>
+              </a:gs>
+            </a:gsLst>
+            <a:lin ang="5400000" scaled="0"/>
+          </a:gradFill>
+        </p:spPr>
+        <p:style>
+          <a:lnRef idx="2">
+            <a:schemeClr val="accent1">
+              <a:shade val="50000"/>
+            </a:schemeClr>
+          </a:lnRef>
+          <a:fillRef idx="1">
+            <a:schemeClr val="accent1"/>
+          </a:fillRef>
+          <a:effectRef idx="0">
+            <a:schemeClr val="accent1"/>
+          </a:effectRef>
+          <a:fontRef idx="minor">
+            <a:schemeClr val="lt1"/>
+          </a:fontRef>
+        </p:style>
+        <p:txBody>
+          <a:bodyPr rtlCol="0" anchor="ctr"/>
+          <a:lstStyle/>
+          <a:p>
+            <a:pPr algn="ctr"/>
+            <a:endParaRPr lang="en-IN"/>
+          </a:p>
+        </p:txBody>
+      </p:sp>
+      <p:sp>
+        <p:nvSpPr>
+          <p:cNvPr id="9" name="Freeform 8"/>
+          <p:cNvSpPr/>
+          <p:nvPr/>
+        </p:nvSpPr>
+        <p:spPr>
+          <a:xfrm>
+            <a:off x="716280" y="3905794"/>
+            <a:ext cx="7918269" cy="2290355"/>
+          </a:xfrm>
+          <a:custGeom>
+            <a:avLst/>
+            <a:gdLst>
+              <a:gd name="connsiteX0" fmla="*/ 250371 w 7918269"/>
+              <a:gd name="connsiteY0" fmla="*/ 0 h 2290355"/>
+              <a:gd name="connsiteX1" fmla="*/ 394063 w 7918269"/>
+              <a:gd name="connsiteY1" fmla="*/ 91440 h 2290355"/>
+              <a:gd name="connsiteX2" fmla="*/ 2614749 w 7918269"/>
+              <a:gd name="connsiteY2" fmla="*/ 548640 h 2290355"/>
+              <a:gd name="connsiteX3" fmla="*/ 4443549 w 7918269"/>
+              <a:gd name="connsiteY3" fmla="*/ 783772 h 2290355"/>
+              <a:gd name="connsiteX4" fmla="*/ 7918269 w 7918269"/>
+              <a:gd name="connsiteY4" fmla="*/ 862149 h 2290355"/>
+              <a:gd name="connsiteX5" fmla="*/ 4443549 w 7918269"/>
+              <a:gd name="connsiteY5" fmla="*/ 1293223 h 2290355"/>
+              <a:gd name="connsiteX6" fmla="*/ 2562497 w 7918269"/>
+              <a:gd name="connsiteY6" fmla="*/ 1476103 h 2290355"/>
+              <a:gd name="connsiteX7" fmla="*/ 394063 w 7918269"/>
+              <a:gd name="connsiteY7" fmla="*/ 2168435 h 2290355"/>
+              <a:gd name="connsiteX8" fmla="*/ 250371 w 7918269"/>
+              <a:gd name="connsiteY8" fmla="*/ 2207623 h 2290355"/>
+              <a:gd name="connsiteX9" fmla="*/ 537754 w 7918269"/>
+              <a:gd name="connsiteY9" fmla="*/ 2090057 h 2290355"/>
+            </a:gdLst>
+            <a:ahLst/>
+            <a:cxnLst>
+              <a:cxn ang="0">
+                <a:pos x="connsiteX0" y="connsiteY0"/>
+              </a:cxn>
+              <a:cxn ang="0">
+                <a:pos x="connsiteX1" y="connsiteY1"/>
+              </a:cxn>
+              <a:cxn ang="0">
+                <a:pos x="connsiteX2" y="connsiteY2"/>
+              </a:cxn>
+              <a:cxn ang="0">
+                <a:pos x="connsiteX3" y="connsiteY3"/>
+              </a:cxn>
+              <a:cxn ang="0">
+                <a:pos x="connsiteX4" y="connsiteY4"/>
+              </a:cxn>
+              <a:cxn ang="0">
+                <a:pos x="connsiteX5" y="connsiteY5"/>
+              </a:cxn>
+              <a:cxn ang="0">
+                <a:pos x="connsiteX6" y="connsiteY6"/>
+              </a:cxn>
+              <a:cxn ang="0">
+                <a:pos x="connsiteX7" y="connsiteY7"/>
+              </a:cxn>
+              <a:cxn ang="0">
+                <a:pos x="connsiteX8" y="connsiteY8"/>
+              </a:cxn>
+              <a:cxn ang="0">
+                <a:pos x="connsiteX9" y="connsiteY9"/>
+              </a:cxn>
+            </a:cxnLst>
+            <a:rect l="l" t="t" r="r" b="b"/>
+            <a:pathLst>
+              <a:path w="7918269" h="2290355">
+                <a:moveTo>
+                  <a:pt x="250371" y="0"/>
+                </a:moveTo>
+                <a:cubicBezTo>
+                  <a:pt x="125185" y="0"/>
+                  <a:pt x="0" y="0"/>
+                  <a:pt x="394063" y="91440"/>
+                </a:cubicBezTo>
+                <a:cubicBezTo>
+                  <a:pt x="788126" y="182880"/>
+                  <a:pt x="1939835" y="433251"/>
+                  <a:pt x="2614749" y="548640"/>
+                </a:cubicBezTo>
+                <a:cubicBezTo>
+                  <a:pt x="3289663" y="664029"/>
+                  <a:pt x="3559629" y="731521"/>
+                  <a:pt x="4443549" y="783772"/>
+                </a:cubicBezTo>
+                <a:cubicBezTo>
+                  <a:pt x="5327469" y="836024"/>
+                  <a:pt x="7918269" y="777241"/>
+                  <a:pt x="7918269" y="862149"/>
+                </a:cubicBezTo>
+                <a:cubicBezTo>
+                  <a:pt x="7918269" y="947057"/>
+                  <a:pt x="5336178" y="1190897"/>
+                  <a:pt x="4443549" y="1293223"/>
+                </a:cubicBezTo>
+                <a:cubicBezTo>
+                  <a:pt x="3550920" y="1395549"/>
+                  <a:pt x="3237411" y="1330234"/>
+                  <a:pt x="2562497" y="1476103"/>
+                </a:cubicBezTo>
+                <a:cubicBezTo>
+                  <a:pt x="1887583" y="1621972"/>
+                  <a:pt x="779417" y="2046515"/>
+                  <a:pt x="394063" y="2168435"/>
+                </a:cubicBezTo>
+                <a:cubicBezTo>
+                  <a:pt x="8709" y="2290355"/>
+                  <a:pt x="226423" y="2220686"/>
+                  <a:pt x="250371" y="2207623"/>
+                </a:cubicBezTo>
+                <a:cubicBezTo>
+                  <a:pt x="274320" y="2194560"/>
+                  <a:pt x="485503" y="2111828"/>
+                  <a:pt x="537754" y="2090057"/>
+                </a:cubicBezTo>
+              </a:path>
+            </a:pathLst>
+          </a:custGeom>
+        </p:spPr>
+        <p:style>
+          <a:lnRef idx="1">
+            <a:schemeClr val="accent1"/>
+          </a:lnRef>
+          <a:fillRef idx="0">
+            <a:schemeClr val="accent1"/>
+          </a:fillRef>
+          <a:effectRef idx="0">
+            <a:schemeClr val="accent1"/>
+          </a:effectRef>
+          <a:fontRef idx="minor">
+            <a:schemeClr val="tx1"/>
+          </a:fontRef>
+        </p:style>
+        <p:txBody>
+          <a:bodyPr rtlCol="0" anchor="ctr"/>
+          <a:lstStyle/>
+          <a:p>
+            <a:pPr algn="ctr"/>
+            <a:endParaRPr lang="en-IN"/>
+          </a:p>
+        </p:txBody>
+      </p:sp>
+      <p:sp>
+        <p:nvSpPr>
+          <p:cNvPr id="10" name="TextBox 9"/>
+          <p:cNvSpPr txBox="1"/>
+          <p:nvPr/>
+        </p:nvSpPr>
+        <p:spPr>
+          <a:xfrm>
+            <a:off x="214282" y="4643446"/>
+            <a:ext cx="2857520" cy="646331"/>
+          </a:xfrm>
+          <a:prstGeom prst="rect">
+            <a:avLst/>
+          </a:prstGeom>
+          <a:noFill/>
+        </p:spPr>
+        <p:txBody>
+          <a:bodyPr wrap="square" rtlCol="0">
+            <a:spAutoFit/>
+          </a:bodyPr>
+          <a:lstStyle/>
+          <a:p>
+            <a:pPr algn="ctr"/>
+            <a:r>
+              <a:rPr lang="en-US" dirty="0" smtClean="0">
+                <a:solidFill>
+                  <a:schemeClr val="tx2">
+                    <a:lumMod val="60000"/>
+                    <a:lumOff val="40000"/>
+                  </a:schemeClr>
+                </a:solidFill>
+              </a:rPr>
+              <a:t>Complete Data Set (Structured/Unstructured)</a:t>
+            </a:r>
+            <a:endParaRPr lang="en-IN" dirty="0">
+              <a:solidFill>
+                <a:schemeClr val="tx2">
+                  <a:lumMod val="60000"/>
+                  <a:lumOff val="40000"/>
+                </a:schemeClr>
+              </a:solidFill>
+            </a:endParaRPr>
+          </a:p>
+        </p:txBody>
+      </p:sp>
+      <p:sp>
+        <p:nvSpPr>
+          <p:cNvPr id="15" name="TextBox 14"/>
+          <p:cNvSpPr txBox="1"/>
+          <p:nvPr/>
+        </p:nvSpPr>
+        <p:spPr>
+          <a:xfrm>
+            <a:off x="2285984" y="6286520"/>
+            <a:ext cx="2071702" cy="369332"/>
+          </a:xfrm>
+          <a:prstGeom prst="rect">
+            <a:avLst/>
+          </a:prstGeom>
+          <a:noFill/>
+        </p:spPr>
+        <p:txBody>
+          <a:bodyPr wrap="square" rtlCol="0">
+            <a:spAutoFit/>
+          </a:bodyPr>
+          <a:lstStyle/>
+          <a:p>
+            <a:pPr algn="ctr"/>
+            <a:r>
+              <a:rPr lang="en-US" b="1" dirty="0" smtClean="0">
+                <a:solidFill>
+                  <a:schemeClr val="tx2">
+                    <a:lumMod val="60000"/>
+                    <a:lumOff val="40000"/>
+                  </a:schemeClr>
+                </a:solidFill>
+              </a:rPr>
+              <a:t>COLLECTION</a:t>
+            </a:r>
+            <a:endParaRPr lang="en-IN" b="1" dirty="0">
+              <a:solidFill>
+                <a:schemeClr val="tx2">
+                  <a:lumMod val="60000"/>
+                  <a:lumOff val="40000"/>
+                </a:schemeClr>
+              </a:solidFill>
+            </a:endParaRPr>
+          </a:p>
+        </p:txBody>
+      </p:sp>
+      <p:sp>
+        <p:nvSpPr>
+          <p:cNvPr id="16" name="TextBox 15"/>
+          <p:cNvSpPr txBox="1"/>
+          <p:nvPr/>
+        </p:nvSpPr>
+        <p:spPr>
+          <a:xfrm>
+            <a:off x="4000496" y="6286520"/>
+            <a:ext cx="2071702" cy="369332"/>
+          </a:xfrm>
+          <a:prstGeom prst="rect">
+            <a:avLst/>
+          </a:prstGeom>
+          <a:noFill/>
+        </p:spPr>
+        <p:txBody>
+          <a:bodyPr wrap="square" rtlCol="0">
+            <a:spAutoFit/>
+          </a:bodyPr>
+          <a:lstStyle/>
+          <a:p>
+            <a:pPr algn="ctr"/>
+            <a:r>
+              <a:rPr lang="en-US" b="1" dirty="0" smtClean="0">
+                <a:solidFill>
+                  <a:schemeClr val="tx2">
+                    <a:lumMod val="60000"/>
+                    <a:lumOff val="40000"/>
+                  </a:schemeClr>
+                </a:solidFill>
+              </a:rPr>
+              <a:t>PRE-PROCESSING</a:t>
+            </a:r>
+            <a:endParaRPr lang="en-IN" b="1" dirty="0">
+              <a:solidFill>
+                <a:schemeClr val="tx2">
+                  <a:lumMod val="60000"/>
+                  <a:lumOff val="40000"/>
+                </a:schemeClr>
+              </a:solidFill>
+            </a:endParaRPr>
+          </a:p>
+        </p:txBody>
+      </p:sp>
+      <p:sp>
+        <p:nvSpPr>
+          <p:cNvPr id="17" name="TextBox 16"/>
+          <p:cNvSpPr txBox="1"/>
+          <p:nvPr/>
+        </p:nvSpPr>
+        <p:spPr>
+          <a:xfrm>
+            <a:off x="6215074" y="6286520"/>
+            <a:ext cx="2071702" cy="646331"/>
+          </a:xfrm>
+          <a:prstGeom prst="rect">
+            <a:avLst/>
+          </a:prstGeom>
+          <a:noFill/>
+        </p:spPr>
+        <p:txBody>
+          <a:bodyPr wrap="square" rtlCol="0">
+            <a:spAutoFit/>
+          </a:bodyPr>
+          <a:lstStyle/>
+          <a:p>
+            <a:pPr algn="ctr"/>
+            <a:r>
+              <a:rPr lang="en-US" b="1" dirty="0" smtClean="0">
+                <a:solidFill>
+                  <a:schemeClr val="tx2">
+                    <a:lumMod val="60000"/>
+                    <a:lumOff val="40000"/>
+                  </a:schemeClr>
+                </a:solidFill>
+              </a:rPr>
+              <a:t>ANALYSIS &amp; VISUALIZATION</a:t>
+            </a:r>
+            <a:endParaRPr lang="en-IN" b="1" dirty="0">
+              <a:solidFill>
+                <a:schemeClr val="tx2">
+                  <a:lumMod val="60000"/>
+                  <a:lumOff val="40000"/>
+                </a:schemeClr>
+              </a:solidFill>
+            </a:endParaRPr>
+          </a:p>
+        </p:txBody>
+      </p:sp>
+      <p:sp>
+        <p:nvSpPr>
+          <p:cNvPr id="18" name="TextBox 17"/>
+          <p:cNvSpPr txBox="1"/>
+          <p:nvPr/>
+        </p:nvSpPr>
+        <p:spPr>
+          <a:xfrm>
+            <a:off x="3571868" y="4786322"/>
+            <a:ext cx="1143008" cy="369332"/>
+          </a:xfrm>
+          <a:prstGeom prst="rect">
+            <a:avLst/>
+          </a:prstGeom>
+          <a:noFill/>
+        </p:spPr>
+        <p:txBody>
+          <a:bodyPr wrap="square" rtlCol="0">
+            <a:spAutoFit/>
+          </a:bodyPr>
+          <a:lstStyle/>
+          <a:p>
+            <a:pPr algn="ctr"/>
+            <a:r>
+              <a:rPr lang="en-US" b="1" dirty="0" smtClean="0">
+                <a:solidFill>
+                  <a:schemeClr val="tx2">
+                    <a:lumMod val="60000"/>
+                    <a:lumOff val="40000"/>
+                  </a:schemeClr>
+                </a:solidFill>
+              </a:rPr>
+              <a:t>Data</a:t>
+            </a:r>
+            <a:endParaRPr lang="en-IN" b="1" dirty="0">
+              <a:solidFill>
+                <a:schemeClr val="tx2">
+                  <a:lumMod val="60000"/>
+                  <a:lumOff val="40000"/>
+                </a:schemeClr>
+              </a:solidFill>
+            </a:endParaRPr>
+          </a:p>
+        </p:txBody>
+      </p:sp>
+      <p:sp>
+        <p:nvSpPr>
+          <p:cNvPr id="19" name="TextBox 18"/>
+          <p:cNvSpPr txBox="1"/>
+          <p:nvPr/>
+        </p:nvSpPr>
+        <p:spPr>
+          <a:xfrm>
+            <a:off x="5429256" y="4786322"/>
+            <a:ext cx="1143008" cy="307777"/>
+          </a:xfrm>
+          <a:prstGeom prst="rect">
+            <a:avLst/>
+          </a:prstGeom>
+          <a:noFill/>
+        </p:spPr>
+        <p:txBody>
+          <a:bodyPr wrap="square" rtlCol="0">
+            <a:spAutoFit/>
+          </a:bodyPr>
+          <a:lstStyle/>
+          <a:p>
+            <a:pPr algn="ctr"/>
+            <a:r>
+              <a:rPr lang="en-US" sz="1400" b="1" dirty="0" smtClean="0">
+                <a:solidFill>
+                  <a:schemeClr val="tx2">
+                    <a:lumMod val="60000"/>
+                    <a:lumOff val="40000"/>
+                  </a:schemeClr>
+                </a:solidFill>
+              </a:rPr>
+              <a:t>Information</a:t>
+            </a:r>
+            <a:endParaRPr lang="en-IN" sz="1400" b="1" dirty="0">
+              <a:solidFill>
+                <a:schemeClr val="tx2">
+                  <a:lumMod val="60000"/>
+                  <a:lumOff val="40000"/>
+                </a:schemeClr>
+              </a:solidFill>
+            </a:endParaRPr>
+          </a:p>
+        </p:txBody>
+      </p:sp>
+      <p:sp>
+        <p:nvSpPr>
+          <p:cNvPr id="20" name="TextBox 19"/>
+          <p:cNvSpPr txBox="1"/>
+          <p:nvPr/>
+        </p:nvSpPr>
+        <p:spPr>
+          <a:xfrm>
+            <a:off x="7572396" y="5000637"/>
+            <a:ext cx="1571604" cy="307777"/>
+          </a:xfrm>
+          <a:prstGeom prst="rect">
+            <a:avLst/>
+          </a:prstGeom>
+          <a:noFill/>
+        </p:spPr>
+        <p:txBody>
+          <a:bodyPr wrap="square" rtlCol="0">
+            <a:spAutoFit/>
+          </a:bodyPr>
+          <a:lstStyle/>
+          <a:p>
+            <a:pPr algn="ctr"/>
+            <a:r>
+              <a:rPr lang="en-US" sz="1400" b="1" dirty="0" smtClean="0">
+                <a:solidFill>
+                  <a:schemeClr val="tx2">
+                    <a:lumMod val="60000"/>
+                    <a:lumOff val="40000"/>
+                  </a:schemeClr>
+                </a:solidFill>
+              </a:rPr>
+              <a:t>Intelligence</a:t>
+            </a:r>
+            <a:endParaRPr lang="en-IN" sz="1400" b="1" dirty="0">
+              <a:solidFill>
+                <a:schemeClr val="tx2">
+                  <a:lumMod val="60000"/>
+                  <a:lumOff val="40000"/>
+                </a:schemeClr>
+              </a:solidFill>
+            </a:endParaRPr>
+          </a:p>
+        </p:txBody>
+      </p:sp>
+      <p:sp>
+        <p:nvSpPr>
+          <p:cNvPr id="21" name="TextBox 20"/>
+          <p:cNvSpPr txBox="1"/>
+          <p:nvPr/>
+        </p:nvSpPr>
+        <p:spPr>
+          <a:xfrm>
+            <a:off x="1714480" y="2000240"/>
+            <a:ext cx="2857520" cy="738664"/>
+          </a:xfrm>
+          <a:prstGeom prst="rect">
+            <a:avLst/>
+          </a:prstGeom>
+          <a:noFill/>
+        </p:spPr>
+        <p:txBody>
+          <a:bodyPr wrap="square" rtlCol="0">
+            <a:spAutoFit/>
+          </a:bodyPr>
+          <a:lstStyle/>
           <a:p>
             <a:pPr lvl="1"/>
             <a:r>
-              <a:rPr lang="en-US" dirty="0" smtClean="0"/>
-              <a:t>Data Collection</a:t>
-            </a:r>
-          </a:p>
+              <a:rPr lang="en-US" sz="2400" dirty="0" smtClean="0"/>
+              <a:t>- Data </a:t>
+            </a:r>
+            <a:r>
+              <a:rPr lang="en-US" sz="2400" dirty="0" smtClean="0"/>
+              <a:t>Collection</a:t>
+            </a:r>
+          </a:p>
+          <a:p>
+            <a:endParaRPr lang="en-IN" dirty="0"/>
+          </a:p>
+        </p:txBody>
+      </p:sp>
+      <p:sp>
+        <p:nvSpPr>
+          <p:cNvPr id="22" name="TextBox 21"/>
+          <p:cNvSpPr txBox="1"/>
+          <p:nvPr/>
+        </p:nvSpPr>
+        <p:spPr>
+          <a:xfrm>
+            <a:off x="1785918" y="2500306"/>
+            <a:ext cx="2786082" cy="738664"/>
+          </a:xfrm>
+          <a:prstGeom prst="rect">
+            <a:avLst/>
+          </a:prstGeom>
+          <a:noFill/>
+        </p:spPr>
+        <p:txBody>
+          <a:bodyPr wrap="square" rtlCol="0">
+            <a:spAutoFit/>
+          </a:bodyPr>
+          <a:lstStyle/>
           <a:p>
             <a:pPr lvl="1"/>
             <a:r>
-              <a:rPr lang="en-US" dirty="0" smtClean="0"/>
-              <a:t>Web Crawling (Cleansing of data).</a:t>
-            </a:r>
-          </a:p>
-          <a:p>
-            <a:pPr lvl="1"/>
-            <a:r>
-              <a:rPr lang="en-US" dirty="0" smtClean="0"/>
-              <a:t>Data Analysis</a:t>
-            </a:r>
-          </a:p>
-          <a:p>
-            <a:pPr lvl="1"/>
-            <a:r>
-              <a:rPr lang="en-US" dirty="0" smtClean="0"/>
-              <a:t>Data Visualization</a:t>
-            </a:r>
+              <a:rPr lang="en-US" sz="2400" dirty="0" smtClean="0"/>
+              <a:t>- Data </a:t>
+            </a:r>
+            <a:r>
+              <a:rPr lang="en-US" sz="2400" dirty="0" smtClean="0"/>
+              <a:t>Cleansing</a:t>
+            </a:r>
+          </a:p>
+          <a:p>
+            <a:endParaRPr lang="en-IN" dirty="0"/>
+          </a:p>
+        </p:txBody>
+      </p:sp>
+      <p:sp>
+        <p:nvSpPr>
+          <p:cNvPr id="23" name="TextBox 22"/>
+          <p:cNvSpPr txBox="1"/>
+          <p:nvPr/>
+        </p:nvSpPr>
+        <p:spPr>
+          <a:xfrm>
+            <a:off x="2357454" y="3000372"/>
+            <a:ext cx="3857620" cy="738664"/>
+          </a:xfrm>
+          <a:prstGeom prst="rect">
+            <a:avLst/>
+          </a:prstGeom>
+          <a:noFill/>
+        </p:spPr>
+        <p:txBody>
+          <a:bodyPr wrap="square" rtlCol="0">
+            <a:spAutoFit/>
+          </a:bodyPr>
+          <a:lstStyle/>
+          <a:p>
+            <a:pPr marL="0" lvl="1"/>
+            <a:r>
+              <a:rPr lang="en-US" sz="2400" dirty="0" smtClean="0"/>
+              <a:t>-Data </a:t>
+            </a:r>
+            <a:r>
+              <a:rPr lang="en-US" sz="2400" dirty="0" smtClean="0"/>
+              <a:t>Analysis &amp; Visualization</a:t>
+            </a:r>
+            <a:endParaRPr lang="en-IN" sz="2400" dirty="0" smtClean="0"/>
+          </a:p>
+          <a:p>
             <a:endParaRPr lang="en-IN" dirty="0"/>
           </a:p>
         </p:txBody>
@@ -3724,9 +4739,1142 @@
   <p:timing>
     <p:tnLst>
       <p:par>
-        <p:cTn id="1" dur="indefinite" restart="never" nodeType="tmRoot"/>
+        <p:cTn id="1" dur="indefinite" restart="never" nodeType="tmRoot">
+          <p:childTnLst>
+            <p:seq concurrent="1" nextAc="seek">
+              <p:cTn id="2" dur="indefinite" nodeType="mainSeq">
+                <p:childTnLst>
+                  <p:par>
+                    <p:cTn id="3" fill="hold">
+                      <p:stCondLst>
+                        <p:cond delay="indefinite"/>
+                      </p:stCondLst>
+                      <p:childTnLst>
+                        <p:par>
+                          <p:cTn id="4" fill="hold">
+                            <p:stCondLst>
+                              <p:cond delay="0"/>
+                            </p:stCondLst>
+                            <p:childTnLst>
+                              <p:par>
+                                <p:cTn id="5" presetID="2" presetClass="entr" presetSubtype="8" fill="hold" grpId="0" nodeType="clickEffect">
+                                  <p:stCondLst>
+                                    <p:cond delay="0"/>
+                                  </p:stCondLst>
+                                  <p:childTnLst>
+                                    <p:set>
+                                      <p:cBhvr>
+                                        <p:cTn id="6" dur="1" fill="hold">
+                                          <p:stCondLst>
+                                            <p:cond delay="0"/>
+                                          </p:stCondLst>
+                                        </p:cTn>
+                                        <p:tgtEl>
+                                          <p:spTgt spid="21"/>
+                                        </p:tgtEl>
+                                        <p:attrNameLst>
+                                          <p:attrName>style.visibility</p:attrName>
+                                        </p:attrNameLst>
+                                      </p:cBhvr>
+                                      <p:to>
+                                        <p:strVal val="visible"/>
+                                      </p:to>
+                                    </p:set>
+                                    <p:anim calcmode="lin" valueType="num">
+                                      <p:cBhvr additive="base">
+                                        <p:cTn id="7" dur="500" fill="hold"/>
+                                        <p:tgtEl>
+                                          <p:spTgt spid="21"/>
+                                        </p:tgtEl>
+                                        <p:attrNameLst>
+                                          <p:attrName>ppt_x</p:attrName>
+                                        </p:attrNameLst>
+                                      </p:cBhvr>
+                                      <p:tavLst>
+                                        <p:tav tm="0">
+                                          <p:val>
+                                            <p:strVal val="0-#ppt_w/2"/>
+                                          </p:val>
+                                        </p:tav>
+                                        <p:tav tm="100000">
+                                          <p:val>
+                                            <p:strVal val="#ppt_x"/>
+                                          </p:val>
+                                        </p:tav>
+                                      </p:tavLst>
+                                    </p:anim>
+                                    <p:anim calcmode="lin" valueType="num">
+                                      <p:cBhvr additive="base">
+                                        <p:cTn id="8" dur="500" fill="hold"/>
+                                        <p:tgtEl>
+                                          <p:spTgt spid="21"/>
+                                        </p:tgtEl>
+                                        <p:attrNameLst>
+                                          <p:attrName>ppt_y</p:attrName>
+                                        </p:attrNameLst>
+                                      </p:cBhvr>
+                                      <p:tavLst>
+                                        <p:tav tm="0">
+                                          <p:val>
+                                            <p:strVal val="#ppt_y"/>
+                                          </p:val>
+                                        </p:tav>
+                                        <p:tav tm="100000">
+                                          <p:val>
+                                            <p:strVal val="#ppt_y"/>
+                                          </p:val>
+                                        </p:tav>
+                                      </p:tavLst>
+                                    </p:anim>
+                                  </p:childTnLst>
+                                </p:cTn>
+                              </p:par>
+                              <p:par>
+                                <p:cTn id="9" presetID="2" presetClass="entr" presetSubtype="8" fill="hold" grpId="0" nodeType="withEffect">
+                                  <p:stCondLst>
+                                    <p:cond delay="0"/>
+                                  </p:stCondLst>
+                                  <p:childTnLst>
+                                    <p:set>
+                                      <p:cBhvr>
+                                        <p:cTn id="10" dur="1" fill="hold">
+                                          <p:stCondLst>
+                                            <p:cond delay="0"/>
+                                          </p:stCondLst>
+                                        </p:cTn>
+                                        <p:tgtEl>
+                                          <p:spTgt spid="4"/>
+                                        </p:tgtEl>
+                                        <p:attrNameLst>
+                                          <p:attrName>style.visibility</p:attrName>
+                                        </p:attrNameLst>
+                                      </p:cBhvr>
+                                      <p:to>
+                                        <p:strVal val="visible"/>
+                                      </p:to>
+                                    </p:set>
+                                    <p:anim calcmode="lin" valueType="num">
+                                      <p:cBhvr additive="base">
+                                        <p:cTn id="11" dur="500" fill="hold"/>
+                                        <p:tgtEl>
+                                          <p:spTgt spid="4"/>
+                                        </p:tgtEl>
+                                        <p:attrNameLst>
+                                          <p:attrName>ppt_x</p:attrName>
+                                        </p:attrNameLst>
+                                      </p:cBhvr>
+                                      <p:tavLst>
+                                        <p:tav tm="0">
+                                          <p:val>
+                                            <p:strVal val="0-#ppt_w/2"/>
+                                          </p:val>
+                                        </p:tav>
+                                        <p:tav tm="100000">
+                                          <p:val>
+                                            <p:strVal val="#ppt_x"/>
+                                          </p:val>
+                                        </p:tav>
+                                      </p:tavLst>
+                                    </p:anim>
+                                    <p:anim calcmode="lin" valueType="num">
+                                      <p:cBhvr additive="base">
+                                        <p:cTn id="12" dur="500" fill="hold"/>
+                                        <p:tgtEl>
+                                          <p:spTgt spid="4"/>
+                                        </p:tgtEl>
+                                        <p:attrNameLst>
+                                          <p:attrName>ppt_y</p:attrName>
+                                        </p:attrNameLst>
+                                      </p:cBhvr>
+                                      <p:tavLst>
+                                        <p:tav tm="0">
+                                          <p:val>
+                                            <p:strVal val="#ppt_y"/>
+                                          </p:val>
+                                        </p:tav>
+                                        <p:tav tm="100000">
+                                          <p:val>
+                                            <p:strVal val="#ppt_y"/>
+                                          </p:val>
+                                        </p:tav>
+                                      </p:tavLst>
+                                    </p:anim>
+                                  </p:childTnLst>
+                                </p:cTn>
+                              </p:par>
+                              <p:par>
+                                <p:cTn id="13" presetID="2" presetClass="entr" presetSubtype="8" fill="hold" grpId="0" nodeType="withEffect">
+                                  <p:stCondLst>
+                                    <p:cond delay="0"/>
+                                  </p:stCondLst>
+                                  <p:childTnLst>
+                                    <p:set>
+                                      <p:cBhvr>
+                                        <p:cTn id="14" dur="1" fill="hold">
+                                          <p:stCondLst>
+                                            <p:cond delay="0"/>
+                                          </p:stCondLst>
+                                        </p:cTn>
+                                        <p:tgtEl>
+                                          <p:spTgt spid="15"/>
+                                        </p:tgtEl>
+                                        <p:attrNameLst>
+                                          <p:attrName>style.visibility</p:attrName>
+                                        </p:attrNameLst>
+                                      </p:cBhvr>
+                                      <p:to>
+                                        <p:strVal val="visible"/>
+                                      </p:to>
+                                    </p:set>
+                                    <p:anim calcmode="lin" valueType="num">
+                                      <p:cBhvr additive="base">
+                                        <p:cTn id="15" dur="500" fill="hold"/>
+                                        <p:tgtEl>
+                                          <p:spTgt spid="15"/>
+                                        </p:tgtEl>
+                                        <p:attrNameLst>
+                                          <p:attrName>ppt_x</p:attrName>
+                                        </p:attrNameLst>
+                                      </p:cBhvr>
+                                      <p:tavLst>
+                                        <p:tav tm="0">
+                                          <p:val>
+                                            <p:strVal val="0-#ppt_w/2"/>
+                                          </p:val>
+                                        </p:tav>
+                                        <p:tav tm="100000">
+                                          <p:val>
+                                            <p:strVal val="#ppt_x"/>
+                                          </p:val>
+                                        </p:tav>
+                                      </p:tavLst>
+                                    </p:anim>
+                                    <p:anim calcmode="lin" valueType="num">
+                                      <p:cBhvr additive="base">
+                                        <p:cTn id="16" dur="500" fill="hold"/>
+                                        <p:tgtEl>
+                                          <p:spTgt spid="15"/>
+                                        </p:tgtEl>
+                                        <p:attrNameLst>
+                                          <p:attrName>ppt_y</p:attrName>
+                                        </p:attrNameLst>
+                                      </p:cBhvr>
+                                      <p:tavLst>
+                                        <p:tav tm="0">
+                                          <p:val>
+                                            <p:strVal val="#ppt_y"/>
+                                          </p:val>
+                                        </p:tav>
+                                        <p:tav tm="100000">
+                                          <p:val>
+                                            <p:strVal val="#ppt_y"/>
+                                          </p:val>
+                                        </p:tav>
+                                      </p:tavLst>
+                                    </p:anim>
+                                  </p:childTnLst>
+                                </p:cTn>
+                              </p:par>
+                            </p:childTnLst>
+                          </p:cTn>
+                        </p:par>
+                      </p:childTnLst>
+                    </p:cTn>
+                  </p:par>
+                  <p:par>
+                    <p:cTn id="17" fill="hold">
+                      <p:stCondLst>
+                        <p:cond delay="indefinite"/>
+                      </p:stCondLst>
+                      <p:childTnLst>
+                        <p:par>
+                          <p:cTn id="18" fill="hold">
+                            <p:stCondLst>
+                              <p:cond delay="0"/>
+                            </p:stCondLst>
+                            <p:childTnLst>
+                              <p:par>
+                                <p:cTn id="19" presetID="2" presetClass="entr" presetSubtype="2" fill="hold" grpId="0" nodeType="clickEffect">
+                                  <p:stCondLst>
+                                    <p:cond delay="0"/>
+                                  </p:stCondLst>
+                                  <p:childTnLst>
+                                    <p:set>
+                                      <p:cBhvr>
+                                        <p:cTn id="20" dur="1" fill="hold">
+                                          <p:stCondLst>
+                                            <p:cond delay="0"/>
+                                          </p:stCondLst>
+                                        </p:cTn>
+                                        <p:tgtEl>
+                                          <p:spTgt spid="22"/>
+                                        </p:tgtEl>
+                                        <p:attrNameLst>
+                                          <p:attrName>style.visibility</p:attrName>
+                                        </p:attrNameLst>
+                                      </p:cBhvr>
+                                      <p:to>
+                                        <p:strVal val="visible"/>
+                                      </p:to>
+                                    </p:set>
+                                    <p:anim calcmode="lin" valueType="num">
+                                      <p:cBhvr additive="base">
+                                        <p:cTn id="21" dur="500" fill="hold"/>
+                                        <p:tgtEl>
+                                          <p:spTgt spid="22"/>
+                                        </p:tgtEl>
+                                        <p:attrNameLst>
+                                          <p:attrName>ppt_x</p:attrName>
+                                        </p:attrNameLst>
+                                      </p:cBhvr>
+                                      <p:tavLst>
+                                        <p:tav tm="0">
+                                          <p:val>
+                                            <p:strVal val="1+#ppt_w/2"/>
+                                          </p:val>
+                                        </p:tav>
+                                        <p:tav tm="100000">
+                                          <p:val>
+                                            <p:strVal val="#ppt_x"/>
+                                          </p:val>
+                                        </p:tav>
+                                      </p:tavLst>
+                                    </p:anim>
+                                    <p:anim calcmode="lin" valueType="num">
+                                      <p:cBhvr additive="base">
+                                        <p:cTn id="22" dur="500" fill="hold"/>
+                                        <p:tgtEl>
+                                          <p:spTgt spid="22"/>
+                                        </p:tgtEl>
+                                        <p:attrNameLst>
+                                          <p:attrName>ppt_y</p:attrName>
+                                        </p:attrNameLst>
+                                      </p:cBhvr>
+                                      <p:tavLst>
+                                        <p:tav tm="0">
+                                          <p:val>
+                                            <p:strVal val="#ppt_y"/>
+                                          </p:val>
+                                        </p:tav>
+                                        <p:tav tm="100000">
+                                          <p:val>
+                                            <p:strVal val="#ppt_y"/>
+                                          </p:val>
+                                        </p:tav>
+                                      </p:tavLst>
+                                    </p:anim>
+                                  </p:childTnLst>
+                                </p:cTn>
+                              </p:par>
+                              <p:par>
+                                <p:cTn id="23" presetID="2" presetClass="entr" presetSubtype="2" fill="hold" grpId="0" nodeType="withEffect">
+                                  <p:stCondLst>
+                                    <p:cond delay="0"/>
+                                  </p:stCondLst>
+                                  <p:childTnLst>
+                                    <p:set>
+                                      <p:cBhvr>
+                                        <p:cTn id="24" dur="1" fill="hold">
+                                          <p:stCondLst>
+                                            <p:cond delay="0"/>
+                                          </p:stCondLst>
+                                        </p:cTn>
+                                        <p:tgtEl>
+                                          <p:spTgt spid="7"/>
+                                        </p:tgtEl>
+                                        <p:attrNameLst>
+                                          <p:attrName>style.visibility</p:attrName>
+                                        </p:attrNameLst>
+                                      </p:cBhvr>
+                                      <p:to>
+                                        <p:strVal val="visible"/>
+                                      </p:to>
+                                    </p:set>
+                                    <p:anim calcmode="lin" valueType="num">
+                                      <p:cBhvr additive="base">
+                                        <p:cTn id="25" dur="500" fill="hold"/>
+                                        <p:tgtEl>
+                                          <p:spTgt spid="7"/>
+                                        </p:tgtEl>
+                                        <p:attrNameLst>
+                                          <p:attrName>ppt_x</p:attrName>
+                                        </p:attrNameLst>
+                                      </p:cBhvr>
+                                      <p:tavLst>
+                                        <p:tav tm="0">
+                                          <p:val>
+                                            <p:strVal val="1+#ppt_w/2"/>
+                                          </p:val>
+                                        </p:tav>
+                                        <p:tav tm="100000">
+                                          <p:val>
+                                            <p:strVal val="#ppt_x"/>
+                                          </p:val>
+                                        </p:tav>
+                                      </p:tavLst>
+                                    </p:anim>
+                                    <p:anim calcmode="lin" valueType="num">
+                                      <p:cBhvr additive="base">
+                                        <p:cTn id="26" dur="500" fill="hold"/>
+                                        <p:tgtEl>
+                                          <p:spTgt spid="7"/>
+                                        </p:tgtEl>
+                                        <p:attrNameLst>
+                                          <p:attrName>ppt_y</p:attrName>
+                                        </p:attrNameLst>
+                                      </p:cBhvr>
+                                      <p:tavLst>
+                                        <p:tav tm="0">
+                                          <p:val>
+                                            <p:strVal val="#ppt_y"/>
+                                          </p:val>
+                                        </p:tav>
+                                        <p:tav tm="100000">
+                                          <p:val>
+                                            <p:strVal val="#ppt_y"/>
+                                          </p:val>
+                                        </p:tav>
+                                      </p:tavLst>
+                                    </p:anim>
+                                  </p:childTnLst>
+                                </p:cTn>
+                              </p:par>
+                              <p:par>
+                                <p:cTn id="27" presetID="2" presetClass="entr" presetSubtype="2" fill="hold" grpId="0" nodeType="withEffect">
+                                  <p:stCondLst>
+                                    <p:cond delay="0"/>
+                                  </p:stCondLst>
+                                  <p:childTnLst>
+                                    <p:set>
+                                      <p:cBhvr>
+                                        <p:cTn id="28" dur="1" fill="hold">
+                                          <p:stCondLst>
+                                            <p:cond delay="0"/>
+                                          </p:stCondLst>
+                                        </p:cTn>
+                                        <p:tgtEl>
+                                          <p:spTgt spid="16"/>
+                                        </p:tgtEl>
+                                        <p:attrNameLst>
+                                          <p:attrName>style.visibility</p:attrName>
+                                        </p:attrNameLst>
+                                      </p:cBhvr>
+                                      <p:to>
+                                        <p:strVal val="visible"/>
+                                      </p:to>
+                                    </p:set>
+                                    <p:anim calcmode="lin" valueType="num">
+                                      <p:cBhvr additive="base">
+                                        <p:cTn id="29" dur="500" fill="hold"/>
+                                        <p:tgtEl>
+                                          <p:spTgt spid="16"/>
+                                        </p:tgtEl>
+                                        <p:attrNameLst>
+                                          <p:attrName>ppt_x</p:attrName>
+                                        </p:attrNameLst>
+                                      </p:cBhvr>
+                                      <p:tavLst>
+                                        <p:tav tm="0">
+                                          <p:val>
+                                            <p:strVal val="1+#ppt_w/2"/>
+                                          </p:val>
+                                        </p:tav>
+                                        <p:tav tm="100000">
+                                          <p:val>
+                                            <p:strVal val="#ppt_x"/>
+                                          </p:val>
+                                        </p:tav>
+                                      </p:tavLst>
+                                    </p:anim>
+                                    <p:anim calcmode="lin" valueType="num">
+                                      <p:cBhvr additive="base">
+                                        <p:cTn id="30" dur="500" fill="hold"/>
+                                        <p:tgtEl>
+                                          <p:spTgt spid="16"/>
+                                        </p:tgtEl>
+                                        <p:attrNameLst>
+                                          <p:attrName>ppt_y</p:attrName>
+                                        </p:attrNameLst>
+                                      </p:cBhvr>
+                                      <p:tavLst>
+                                        <p:tav tm="0">
+                                          <p:val>
+                                            <p:strVal val="#ppt_y"/>
+                                          </p:val>
+                                        </p:tav>
+                                        <p:tav tm="100000">
+                                          <p:val>
+                                            <p:strVal val="#ppt_y"/>
+                                          </p:val>
+                                        </p:tav>
+                                      </p:tavLst>
+                                    </p:anim>
+                                  </p:childTnLst>
+                                </p:cTn>
+                              </p:par>
+                            </p:childTnLst>
+                          </p:cTn>
+                        </p:par>
+                      </p:childTnLst>
+                    </p:cTn>
+                  </p:par>
+                  <p:par>
+                    <p:cTn id="31" fill="hold">
+                      <p:stCondLst>
+                        <p:cond delay="indefinite"/>
+                      </p:stCondLst>
+                      <p:childTnLst>
+                        <p:par>
+                          <p:cTn id="32" fill="hold">
+                            <p:stCondLst>
+                              <p:cond delay="0"/>
+                            </p:stCondLst>
+                            <p:childTnLst>
+                              <p:par>
+                                <p:cTn id="33" presetID="2" presetClass="entr" presetSubtype="2" fill="hold" grpId="0" nodeType="clickEffect">
+                                  <p:stCondLst>
+                                    <p:cond delay="0"/>
+                                  </p:stCondLst>
+                                  <p:childTnLst>
+                                    <p:set>
+                                      <p:cBhvr>
+                                        <p:cTn id="34" dur="1" fill="hold">
+                                          <p:stCondLst>
+                                            <p:cond delay="0"/>
+                                          </p:stCondLst>
+                                        </p:cTn>
+                                        <p:tgtEl>
+                                          <p:spTgt spid="23"/>
+                                        </p:tgtEl>
+                                        <p:attrNameLst>
+                                          <p:attrName>style.visibility</p:attrName>
+                                        </p:attrNameLst>
+                                      </p:cBhvr>
+                                      <p:to>
+                                        <p:strVal val="visible"/>
+                                      </p:to>
+                                    </p:set>
+                                    <p:anim calcmode="lin" valueType="num">
+                                      <p:cBhvr additive="base">
+                                        <p:cTn id="35" dur="500" fill="hold"/>
+                                        <p:tgtEl>
+                                          <p:spTgt spid="23"/>
+                                        </p:tgtEl>
+                                        <p:attrNameLst>
+                                          <p:attrName>ppt_x</p:attrName>
+                                        </p:attrNameLst>
+                                      </p:cBhvr>
+                                      <p:tavLst>
+                                        <p:tav tm="0">
+                                          <p:val>
+                                            <p:strVal val="1+#ppt_w/2"/>
+                                          </p:val>
+                                        </p:tav>
+                                        <p:tav tm="100000">
+                                          <p:val>
+                                            <p:strVal val="#ppt_x"/>
+                                          </p:val>
+                                        </p:tav>
+                                      </p:tavLst>
+                                    </p:anim>
+                                    <p:anim calcmode="lin" valueType="num">
+                                      <p:cBhvr additive="base">
+                                        <p:cTn id="36" dur="500" fill="hold"/>
+                                        <p:tgtEl>
+                                          <p:spTgt spid="23"/>
+                                        </p:tgtEl>
+                                        <p:attrNameLst>
+                                          <p:attrName>ppt_y</p:attrName>
+                                        </p:attrNameLst>
+                                      </p:cBhvr>
+                                      <p:tavLst>
+                                        <p:tav tm="0">
+                                          <p:val>
+                                            <p:strVal val="#ppt_y"/>
+                                          </p:val>
+                                        </p:tav>
+                                        <p:tav tm="100000">
+                                          <p:val>
+                                            <p:strVal val="#ppt_y"/>
+                                          </p:val>
+                                        </p:tav>
+                                      </p:tavLst>
+                                    </p:anim>
+                                  </p:childTnLst>
+                                </p:cTn>
+                              </p:par>
+                              <p:par>
+                                <p:cTn id="37" presetID="2" presetClass="entr" presetSubtype="2" fill="hold" grpId="0" nodeType="withEffect">
+                                  <p:stCondLst>
+                                    <p:cond delay="0"/>
+                                  </p:stCondLst>
+                                  <p:childTnLst>
+                                    <p:set>
+                                      <p:cBhvr>
+                                        <p:cTn id="38" dur="1" fill="hold">
+                                          <p:stCondLst>
+                                            <p:cond delay="0"/>
+                                          </p:stCondLst>
+                                        </p:cTn>
+                                        <p:tgtEl>
+                                          <p:spTgt spid="8"/>
+                                        </p:tgtEl>
+                                        <p:attrNameLst>
+                                          <p:attrName>style.visibility</p:attrName>
+                                        </p:attrNameLst>
+                                      </p:cBhvr>
+                                      <p:to>
+                                        <p:strVal val="visible"/>
+                                      </p:to>
+                                    </p:set>
+                                    <p:anim calcmode="lin" valueType="num">
+                                      <p:cBhvr additive="base">
+                                        <p:cTn id="39" dur="500" fill="hold"/>
+                                        <p:tgtEl>
+                                          <p:spTgt spid="8"/>
+                                        </p:tgtEl>
+                                        <p:attrNameLst>
+                                          <p:attrName>ppt_x</p:attrName>
+                                        </p:attrNameLst>
+                                      </p:cBhvr>
+                                      <p:tavLst>
+                                        <p:tav tm="0">
+                                          <p:val>
+                                            <p:strVal val="1+#ppt_w/2"/>
+                                          </p:val>
+                                        </p:tav>
+                                        <p:tav tm="100000">
+                                          <p:val>
+                                            <p:strVal val="#ppt_x"/>
+                                          </p:val>
+                                        </p:tav>
+                                      </p:tavLst>
+                                    </p:anim>
+                                    <p:anim calcmode="lin" valueType="num">
+                                      <p:cBhvr additive="base">
+                                        <p:cTn id="40" dur="500" fill="hold"/>
+                                        <p:tgtEl>
+                                          <p:spTgt spid="8"/>
+                                        </p:tgtEl>
+                                        <p:attrNameLst>
+                                          <p:attrName>ppt_y</p:attrName>
+                                        </p:attrNameLst>
+                                      </p:cBhvr>
+                                      <p:tavLst>
+                                        <p:tav tm="0">
+                                          <p:val>
+                                            <p:strVal val="#ppt_y"/>
+                                          </p:val>
+                                        </p:tav>
+                                        <p:tav tm="100000">
+                                          <p:val>
+                                            <p:strVal val="#ppt_y"/>
+                                          </p:val>
+                                        </p:tav>
+                                      </p:tavLst>
+                                    </p:anim>
+                                  </p:childTnLst>
+                                </p:cTn>
+                              </p:par>
+                              <p:par>
+                                <p:cTn id="41" presetID="2" presetClass="entr" presetSubtype="2" fill="hold" grpId="0" nodeType="withEffect">
+                                  <p:stCondLst>
+                                    <p:cond delay="0"/>
+                                  </p:stCondLst>
+                                  <p:childTnLst>
+                                    <p:set>
+                                      <p:cBhvr>
+                                        <p:cTn id="42" dur="1" fill="hold">
+                                          <p:stCondLst>
+                                            <p:cond delay="0"/>
+                                          </p:stCondLst>
+                                        </p:cTn>
+                                        <p:tgtEl>
+                                          <p:spTgt spid="17"/>
+                                        </p:tgtEl>
+                                        <p:attrNameLst>
+                                          <p:attrName>style.visibility</p:attrName>
+                                        </p:attrNameLst>
+                                      </p:cBhvr>
+                                      <p:to>
+                                        <p:strVal val="visible"/>
+                                      </p:to>
+                                    </p:set>
+                                    <p:anim calcmode="lin" valueType="num">
+                                      <p:cBhvr additive="base">
+                                        <p:cTn id="43" dur="500" fill="hold"/>
+                                        <p:tgtEl>
+                                          <p:spTgt spid="17"/>
+                                        </p:tgtEl>
+                                        <p:attrNameLst>
+                                          <p:attrName>ppt_x</p:attrName>
+                                        </p:attrNameLst>
+                                      </p:cBhvr>
+                                      <p:tavLst>
+                                        <p:tav tm="0">
+                                          <p:val>
+                                            <p:strVal val="1+#ppt_w/2"/>
+                                          </p:val>
+                                        </p:tav>
+                                        <p:tav tm="100000">
+                                          <p:val>
+                                            <p:strVal val="#ppt_x"/>
+                                          </p:val>
+                                        </p:tav>
+                                      </p:tavLst>
+                                    </p:anim>
+                                    <p:anim calcmode="lin" valueType="num">
+                                      <p:cBhvr additive="base">
+                                        <p:cTn id="44" dur="500" fill="hold"/>
+                                        <p:tgtEl>
+                                          <p:spTgt spid="17"/>
+                                        </p:tgtEl>
+                                        <p:attrNameLst>
+                                          <p:attrName>ppt_y</p:attrName>
+                                        </p:attrNameLst>
+                                      </p:cBhvr>
+                                      <p:tavLst>
+                                        <p:tav tm="0">
+                                          <p:val>
+                                            <p:strVal val="#ppt_y"/>
+                                          </p:val>
+                                        </p:tav>
+                                        <p:tav tm="100000">
+                                          <p:val>
+                                            <p:strVal val="#ppt_y"/>
+                                          </p:val>
+                                        </p:tav>
+                                      </p:tavLst>
+                                    </p:anim>
+                                  </p:childTnLst>
+                                </p:cTn>
+                              </p:par>
+                            </p:childTnLst>
+                          </p:cTn>
+                        </p:par>
+                      </p:childTnLst>
+                    </p:cTn>
+                  </p:par>
+                  <p:par>
+                    <p:cTn id="45" fill="hold">
+                      <p:stCondLst>
+                        <p:cond delay="indefinite"/>
+                      </p:stCondLst>
+                      <p:childTnLst>
+                        <p:par>
+                          <p:cTn id="46" fill="hold">
+                            <p:stCondLst>
+                              <p:cond delay="0"/>
+                            </p:stCondLst>
+                            <p:childTnLst>
+                              <p:par>
+                                <p:cTn id="47" presetID="2" presetClass="entr" presetSubtype="8" fill="hold" grpId="0" nodeType="clickEffect">
+                                  <p:stCondLst>
+                                    <p:cond delay="0"/>
+                                  </p:stCondLst>
+                                  <p:childTnLst>
+                                    <p:set>
+                                      <p:cBhvr>
+                                        <p:cTn id="48" dur="1" fill="hold">
+                                          <p:stCondLst>
+                                            <p:cond delay="0"/>
+                                          </p:stCondLst>
+                                        </p:cTn>
+                                        <p:tgtEl>
+                                          <p:spTgt spid="9"/>
+                                        </p:tgtEl>
+                                        <p:attrNameLst>
+                                          <p:attrName>style.visibility</p:attrName>
+                                        </p:attrNameLst>
+                                      </p:cBhvr>
+                                      <p:to>
+                                        <p:strVal val="visible"/>
+                                      </p:to>
+                                    </p:set>
+                                    <p:anim calcmode="lin" valueType="num">
+                                      <p:cBhvr additive="base">
+                                        <p:cTn id="49" dur="2000" fill="hold"/>
+                                        <p:tgtEl>
+                                          <p:spTgt spid="9"/>
+                                        </p:tgtEl>
+                                        <p:attrNameLst>
+                                          <p:attrName>ppt_x</p:attrName>
+                                        </p:attrNameLst>
+                                      </p:cBhvr>
+                                      <p:tavLst>
+                                        <p:tav tm="0">
+                                          <p:val>
+                                            <p:strVal val="0-#ppt_w/2"/>
+                                          </p:val>
+                                        </p:tav>
+                                        <p:tav tm="100000">
+                                          <p:val>
+                                            <p:strVal val="#ppt_x"/>
+                                          </p:val>
+                                        </p:tav>
+                                      </p:tavLst>
+                                    </p:anim>
+                                    <p:anim calcmode="lin" valueType="num">
+                                      <p:cBhvr additive="base">
+                                        <p:cTn id="50" dur="2000" fill="hold"/>
+                                        <p:tgtEl>
+                                          <p:spTgt spid="9"/>
+                                        </p:tgtEl>
+                                        <p:attrNameLst>
+                                          <p:attrName>ppt_y</p:attrName>
+                                        </p:attrNameLst>
+                                      </p:cBhvr>
+                                      <p:tavLst>
+                                        <p:tav tm="0">
+                                          <p:val>
+                                            <p:strVal val="#ppt_y"/>
+                                          </p:val>
+                                        </p:tav>
+                                        <p:tav tm="100000">
+                                          <p:val>
+                                            <p:strVal val="#ppt_y"/>
+                                          </p:val>
+                                        </p:tav>
+                                      </p:tavLst>
+                                    </p:anim>
+                                  </p:childTnLst>
+                                </p:cTn>
+                              </p:par>
+                              <p:par>
+                                <p:cTn id="51" presetID="2" presetClass="entr" presetSubtype="8" fill="hold" grpId="0" nodeType="withEffect">
+                                  <p:stCondLst>
+                                    <p:cond delay="0"/>
+                                  </p:stCondLst>
+                                  <p:childTnLst>
+                                    <p:set>
+                                      <p:cBhvr>
+                                        <p:cTn id="52" dur="1" fill="hold">
+                                          <p:stCondLst>
+                                            <p:cond delay="0"/>
+                                          </p:stCondLst>
+                                        </p:cTn>
+                                        <p:tgtEl>
+                                          <p:spTgt spid="10"/>
+                                        </p:tgtEl>
+                                        <p:attrNameLst>
+                                          <p:attrName>style.visibility</p:attrName>
+                                        </p:attrNameLst>
+                                      </p:cBhvr>
+                                      <p:to>
+                                        <p:strVal val="visible"/>
+                                      </p:to>
+                                    </p:set>
+                                    <p:anim calcmode="lin" valueType="num">
+                                      <p:cBhvr additive="base">
+                                        <p:cTn id="53" dur="2000" fill="hold"/>
+                                        <p:tgtEl>
+                                          <p:spTgt spid="10"/>
+                                        </p:tgtEl>
+                                        <p:attrNameLst>
+                                          <p:attrName>ppt_x</p:attrName>
+                                        </p:attrNameLst>
+                                      </p:cBhvr>
+                                      <p:tavLst>
+                                        <p:tav tm="0">
+                                          <p:val>
+                                            <p:strVal val="0-#ppt_w/2"/>
+                                          </p:val>
+                                        </p:tav>
+                                        <p:tav tm="100000">
+                                          <p:val>
+                                            <p:strVal val="#ppt_x"/>
+                                          </p:val>
+                                        </p:tav>
+                                      </p:tavLst>
+                                    </p:anim>
+                                    <p:anim calcmode="lin" valueType="num">
+                                      <p:cBhvr additive="base">
+                                        <p:cTn id="54" dur="2000" fill="hold"/>
+                                        <p:tgtEl>
+                                          <p:spTgt spid="10"/>
+                                        </p:tgtEl>
+                                        <p:attrNameLst>
+                                          <p:attrName>ppt_y</p:attrName>
+                                        </p:attrNameLst>
+                                      </p:cBhvr>
+                                      <p:tavLst>
+                                        <p:tav tm="0">
+                                          <p:val>
+                                            <p:strVal val="#ppt_y"/>
+                                          </p:val>
+                                        </p:tav>
+                                        <p:tav tm="100000">
+                                          <p:val>
+                                            <p:strVal val="#ppt_y"/>
+                                          </p:val>
+                                        </p:tav>
+                                      </p:tavLst>
+                                    </p:anim>
+                                  </p:childTnLst>
+                                </p:cTn>
+                              </p:par>
+                              <p:par>
+                                <p:cTn id="55" presetID="2" presetClass="entr" presetSubtype="8" fill="hold" grpId="0" nodeType="withEffect">
+                                  <p:stCondLst>
+                                    <p:cond delay="0"/>
+                                  </p:stCondLst>
+                                  <p:childTnLst>
+                                    <p:set>
+                                      <p:cBhvr>
+                                        <p:cTn id="56" dur="1" fill="hold">
+                                          <p:stCondLst>
+                                            <p:cond delay="0"/>
+                                          </p:stCondLst>
+                                        </p:cTn>
+                                        <p:tgtEl>
+                                          <p:spTgt spid="18"/>
+                                        </p:tgtEl>
+                                        <p:attrNameLst>
+                                          <p:attrName>style.visibility</p:attrName>
+                                        </p:attrNameLst>
+                                      </p:cBhvr>
+                                      <p:to>
+                                        <p:strVal val="visible"/>
+                                      </p:to>
+                                    </p:set>
+                                    <p:anim calcmode="lin" valueType="num">
+                                      <p:cBhvr additive="base">
+                                        <p:cTn id="57" dur="2000" fill="hold"/>
+                                        <p:tgtEl>
+                                          <p:spTgt spid="18"/>
+                                        </p:tgtEl>
+                                        <p:attrNameLst>
+                                          <p:attrName>ppt_x</p:attrName>
+                                        </p:attrNameLst>
+                                      </p:cBhvr>
+                                      <p:tavLst>
+                                        <p:tav tm="0">
+                                          <p:val>
+                                            <p:strVal val="0-#ppt_w/2"/>
+                                          </p:val>
+                                        </p:tav>
+                                        <p:tav tm="100000">
+                                          <p:val>
+                                            <p:strVal val="#ppt_x"/>
+                                          </p:val>
+                                        </p:tav>
+                                      </p:tavLst>
+                                    </p:anim>
+                                    <p:anim calcmode="lin" valueType="num">
+                                      <p:cBhvr additive="base">
+                                        <p:cTn id="58" dur="2000" fill="hold"/>
+                                        <p:tgtEl>
+                                          <p:spTgt spid="18"/>
+                                        </p:tgtEl>
+                                        <p:attrNameLst>
+                                          <p:attrName>ppt_y</p:attrName>
+                                        </p:attrNameLst>
+                                      </p:cBhvr>
+                                      <p:tavLst>
+                                        <p:tav tm="0">
+                                          <p:val>
+                                            <p:strVal val="#ppt_y"/>
+                                          </p:val>
+                                        </p:tav>
+                                        <p:tav tm="100000">
+                                          <p:val>
+                                            <p:strVal val="#ppt_y"/>
+                                          </p:val>
+                                        </p:tav>
+                                      </p:tavLst>
+                                    </p:anim>
+                                  </p:childTnLst>
+                                </p:cTn>
+                              </p:par>
+                              <p:par>
+                                <p:cTn id="59" presetID="2" presetClass="entr" presetSubtype="8" fill="hold" grpId="0" nodeType="withEffect">
+                                  <p:stCondLst>
+                                    <p:cond delay="0"/>
+                                  </p:stCondLst>
+                                  <p:childTnLst>
+                                    <p:set>
+                                      <p:cBhvr>
+                                        <p:cTn id="60" dur="1" fill="hold">
+                                          <p:stCondLst>
+                                            <p:cond delay="0"/>
+                                          </p:stCondLst>
+                                        </p:cTn>
+                                        <p:tgtEl>
+                                          <p:spTgt spid="19"/>
+                                        </p:tgtEl>
+                                        <p:attrNameLst>
+                                          <p:attrName>style.visibility</p:attrName>
+                                        </p:attrNameLst>
+                                      </p:cBhvr>
+                                      <p:to>
+                                        <p:strVal val="visible"/>
+                                      </p:to>
+                                    </p:set>
+                                    <p:anim calcmode="lin" valueType="num">
+                                      <p:cBhvr additive="base">
+                                        <p:cTn id="61" dur="2000" fill="hold"/>
+                                        <p:tgtEl>
+                                          <p:spTgt spid="19"/>
+                                        </p:tgtEl>
+                                        <p:attrNameLst>
+                                          <p:attrName>ppt_x</p:attrName>
+                                        </p:attrNameLst>
+                                      </p:cBhvr>
+                                      <p:tavLst>
+                                        <p:tav tm="0">
+                                          <p:val>
+                                            <p:strVal val="0-#ppt_w/2"/>
+                                          </p:val>
+                                        </p:tav>
+                                        <p:tav tm="100000">
+                                          <p:val>
+                                            <p:strVal val="#ppt_x"/>
+                                          </p:val>
+                                        </p:tav>
+                                      </p:tavLst>
+                                    </p:anim>
+                                    <p:anim calcmode="lin" valueType="num">
+                                      <p:cBhvr additive="base">
+                                        <p:cTn id="62" dur="2000" fill="hold"/>
+                                        <p:tgtEl>
+                                          <p:spTgt spid="19"/>
+                                        </p:tgtEl>
+                                        <p:attrNameLst>
+                                          <p:attrName>ppt_y</p:attrName>
+                                        </p:attrNameLst>
+                                      </p:cBhvr>
+                                      <p:tavLst>
+                                        <p:tav tm="0">
+                                          <p:val>
+                                            <p:strVal val="#ppt_y"/>
+                                          </p:val>
+                                        </p:tav>
+                                        <p:tav tm="100000">
+                                          <p:val>
+                                            <p:strVal val="#ppt_y"/>
+                                          </p:val>
+                                        </p:tav>
+                                      </p:tavLst>
+                                    </p:anim>
+                                  </p:childTnLst>
+                                </p:cTn>
+                              </p:par>
+                              <p:par>
+                                <p:cTn id="63" presetID="2" presetClass="entr" presetSubtype="8" fill="hold" grpId="0" nodeType="withEffect">
+                                  <p:stCondLst>
+                                    <p:cond delay="0"/>
+                                  </p:stCondLst>
+                                  <p:childTnLst>
+                                    <p:set>
+                                      <p:cBhvr>
+                                        <p:cTn id="64" dur="1" fill="hold">
+                                          <p:stCondLst>
+                                            <p:cond delay="0"/>
+                                          </p:stCondLst>
+                                        </p:cTn>
+                                        <p:tgtEl>
+                                          <p:spTgt spid="20"/>
+                                        </p:tgtEl>
+                                        <p:attrNameLst>
+                                          <p:attrName>style.visibility</p:attrName>
+                                        </p:attrNameLst>
+                                      </p:cBhvr>
+                                      <p:to>
+                                        <p:strVal val="visible"/>
+                                      </p:to>
+                                    </p:set>
+                                    <p:anim calcmode="lin" valueType="num">
+                                      <p:cBhvr additive="base">
+                                        <p:cTn id="65" dur="2000" fill="hold"/>
+                                        <p:tgtEl>
+                                          <p:spTgt spid="20"/>
+                                        </p:tgtEl>
+                                        <p:attrNameLst>
+                                          <p:attrName>ppt_x</p:attrName>
+                                        </p:attrNameLst>
+                                      </p:cBhvr>
+                                      <p:tavLst>
+                                        <p:tav tm="0">
+                                          <p:val>
+                                            <p:strVal val="0-#ppt_w/2"/>
+                                          </p:val>
+                                        </p:tav>
+                                        <p:tav tm="100000">
+                                          <p:val>
+                                            <p:strVal val="#ppt_x"/>
+                                          </p:val>
+                                        </p:tav>
+                                      </p:tavLst>
+                                    </p:anim>
+                                    <p:anim calcmode="lin" valueType="num">
+                                      <p:cBhvr additive="base">
+                                        <p:cTn id="66" dur="2000" fill="hold"/>
+                                        <p:tgtEl>
+                                          <p:spTgt spid="20"/>
+                                        </p:tgtEl>
+                                        <p:attrNameLst>
+                                          <p:attrName>ppt_y</p:attrName>
+                                        </p:attrNameLst>
+                                      </p:cBhvr>
+                                      <p:tavLst>
+                                        <p:tav tm="0">
+                                          <p:val>
+                                            <p:strVal val="#ppt_y"/>
+                                          </p:val>
+                                        </p:tav>
+                                        <p:tav tm="100000">
+                                          <p:val>
+                                            <p:strVal val="#ppt_y"/>
+                                          </p:val>
+                                        </p:tav>
+                                      </p:tavLst>
+                                    </p:anim>
+                                  </p:childTnLst>
+                                </p:cTn>
+                              </p:par>
+                            </p:childTnLst>
+                          </p:cTn>
+                        </p:par>
+                      </p:childTnLst>
+                    </p:cTn>
+                  </p:par>
+                </p:childTnLst>
+              </p:cTn>
+              <p:prevCondLst>
+                <p:cond evt="onPrev" delay="0">
+                  <p:tgtEl>
+                    <p:sldTgt/>
+                  </p:tgtEl>
+                </p:cond>
+              </p:prevCondLst>
+              <p:nextCondLst>
+                <p:cond evt="onNext" delay="0">
+                  <p:tgtEl>
+                    <p:sldTgt/>
+                  </p:tgtEl>
+                </p:cond>
+              </p:nextCondLst>
+            </p:seq>
+          </p:childTnLst>
+        </p:cTn>
       </p:par>
     </p:tnLst>
+    <p:bldLst>
+      <p:bldP spid="4" grpId="0" animBg="1"/>
+      <p:bldP spid="7" grpId="0" animBg="1"/>
+      <p:bldP spid="8" grpId="0" animBg="1"/>
+      <p:bldP spid="9" grpId="0" animBg="1"/>
+      <p:bldP spid="10" grpId="0"/>
+      <p:bldP spid="15" grpId="0"/>
+      <p:bldP spid="16" grpId="0"/>
+      <p:bldP spid="17" grpId="0"/>
+      <p:bldP spid="18" grpId="0"/>
+      <p:bldP spid="19" grpId="0"/>
+      <p:bldP spid="20" grpId="0"/>
+      <p:bldP spid="21" grpId="0"/>
+      <p:bldP spid="22" grpId="0"/>
+      <p:bldP spid="23" grpId="0"/>
+    </p:bldLst>
   </p:timing>
 </p:sld>
 </file>
@@ -7219,6 +9367,969 @@
       </p:grpSpPr>
       <p:sp>
         <p:nvSpPr>
+          <p:cNvPr id="3" name="Content Placeholder 2"/>
+          <p:cNvSpPr>
+            <a:spLocks noGrp="1"/>
+          </p:cNvSpPr>
+          <p:nvPr>
+            <p:ph idx="1"/>
+          </p:nvPr>
+        </p:nvSpPr>
+        <p:spPr>
+          <a:xfrm>
+            <a:off x="457200" y="1600201"/>
+            <a:ext cx="8229600" cy="1614486"/>
+          </a:xfrm>
+        </p:spPr>
+        <p:txBody>
+          <a:bodyPr>
+            <a:normAutofit/>
+          </a:bodyPr>
+          <a:lstStyle/>
+          <a:p>
+            <a:r>
+              <a:rPr lang="en-US" dirty="0" smtClean="0"/>
+              <a:t>The data obtained in the previous step needs to be processed to obtain the information that we require such as</a:t>
+            </a:r>
+          </a:p>
+          <a:p>
+            <a:endParaRPr lang="en-US" dirty="0" smtClean="0"/>
+          </a:p>
+          <a:p>
+            <a:pPr lvl="1"/>
+            <a:endParaRPr lang="en-IN" dirty="0"/>
+          </a:p>
+        </p:txBody>
+      </p:sp>
+      <p:sp>
+        <p:nvSpPr>
+          <p:cNvPr id="4" name="Title 1"/>
+          <p:cNvSpPr>
+            <a:spLocks noGrp="1"/>
+          </p:cNvSpPr>
+          <p:nvPr>
+            <p:ph type="title"/>
+          </p:nvPr>
+        </p:nvSpPr>
+        <p:spPr>
+          <a:xfrm>
+            <a:off x="457200" y="274638"/>
+            <a:ext cx="8229600" cy="868346"/>
+          </a:xfrm>
+        </p:spPr>
+        <p:txBody>
+          <a:bodyPr>
+            <a:normAutofit/>
+          </a:bodyPr>
+          <a:lstStyle/>
+          <a:p>
+            <a:pPr algn="l"/>
+            <a:r>
+              <a:rPr lang="en-US" sz="3600" dirty="0" smtClean="0"/>
+              <a:t>DATA </a:t>
+            </a:r>
+            <a:r>
+              <a:rPr lang="en-US" sz="3600" dirty="0" smtClean="0"/>
+              <a:t>PRE - PROCESSING</a:t>
+            </a:r>
+            <a:endParaRPr lang="en-IN" sz="3600" dirty="0"/>
+          </a:p>
+        </p:txBody>
+      </p:sp>
+      <p:pic>
+        <p:nvPicPr>
+          <p:cNvPr id="5" name="Picture 4" descr="custom-size.png"/>
+          <p:cNvPicPr>
+            <a:picLocks noChangeAspect="1"/>
+          </p:cNvPicPr>
+          <p:nvPr/>
+        </p:nvPicPr>
+        <p:blipFill>
+          <a:blip r:embed="rId2" cstate="print"/>
+          <a:stretch>
+            <a:fillRect/>
+          </a:stretch>
+        </p:blipFill>
+        <p:spPr>
+          <a:xfrm>
+            <a:off x="571472" y="5143512"/>
+            <a:ext cx="1857356" cy="1238237"/>
+          </a:xfrm>
+          <a:prstGeom prst="rect">
+            <a:avLst/>
+          </a:prstGeom>
+        </p:spPr>
+      </p:pic>
+      <p:pic>
+        <p:nvPicPr>
+          <p:cNvPr id="6" name="Picture 5" descr="js.png"/>
+          <p:cNvPicPr>
+            <a:picLocks noChangeAspect="1"/>
+          </p:cNvPicPr>
+          <p:nvPr/>
+        </p:nvPicPr>
+        <p:blipFill>
+          <a:blip r:embed="rId3"/>
+          <a:stretch>
+            <a:fillRect/>
+          </a:stretch>
+        </p:blipFill>
+        <p:spPr>
+          <a:xfrm>
+            <a:off x="3357554" y="4857760"/>
+            <a:ext cx="1647828" cy="1647828"/>
+          </a:xfrm>
+          <a:prstGeom prst="rect">
+            <a:avLst/>
+          </a:prstGeom>
+        </p:spPr>
+      </p:pic>
+      <p:pic>
+        <p:nvPicPr>
+          <p:cNvPr id="7" name="Picture 6" descr="cache.png"/>
+          <p:cNvPicPr>
+            <a:picLocks noChangeAspect="1"/>
+          </p:cNvPicPr>
+          <p:nvPr/>
+        </p:nvPicPr>
+        <p:blipFill>
+          <a:blip r:embed="rId4"/>
+          <a:stretch>
+            <a:fillRect/>
+          </a:stretch>
+        </p:blipFill>
+        <p:spPr>
+          <a:xfrm>
+            <a:off x="6143636" y="4929198"/>
+            <a:ext cx="1579356" cy="1579356"/>
+          </a:xfrm>
+          <a:prstGeom prst="rect">
+            <a:avLst/>
+          </a:prstGeom>
+        </p:spPr>
+      </p:pic>
+      <p:sp>
+        <p:nvSpPr>
+          <p:cNvPr id="8" name="TextBox 7"/>
+          <p:cNvSpPr txBox="1"/>
+          <p:nvPr/>
+        </p:nvSpPr>
+        <p:spPr>
+          <a:xfrm>
+            <a:off x="1714480" y="3214687"/>
+            <a:ext cx="4143404" cy="707886"/>
+          </a:xfrm>
+          <a:prstGeom prst="rect">
+            <a:avLst/>
+          </a:prstGeom>
+          <a:noFill/>
+        </p:spPr>
+        <p:txBody>
+          <a:bodyPr wrap="square" rtlCol="0">
+            <a:spAutoFit/>
+          </a:bodyPr>
+          <a:lstStyle/>
+          <a:p>
+            <a:pPr lvl="1"/>
+            <a:r>
+              <a:rPr lang="en-US" sz="2000" b="1" dirty="0" smtClean="0"/>
+              <a:t>- Size of the page.</a:t>
+            </a:r>
+          </a:p>
+          <a:p>
+            <a:endParaRPr lang="en-IN" sz="2000" b="1" dirty="0"/>
+          </a:p>
+        </p:txBody>
+      </p:sp>
+      <p:sp>
+        <p:nvSpPr>
+          <p:cNvPr id="9" name="TextBox 8"/>
+          <p:cNvSpPr txBox="1"/>
+          <p:nvPr/>
+        </p:nvSpPr>
+        <p:spPr>
+          <a:xfrm>
+            <a:off x="1714480" y="3643314"/>
+            <a:ext cx="4143404" cy="400110"/>
+          </a:xfrm>
+          <a:prstGeom prst="rect">
+            <a:avLst/>
+          </a:prstGeom>
+          <a:noFill/>
+        </p:spPr>
+        <p:txBody>
+          <a:bodyPr wrap="square" rtlCol="0">
+            <a:spAutoFit/>
+          </a:bodyPr>
+          <a:lstStyle/>
+          <a:p>
+            <a:pPr lvl="1"/>
+            <a:r>
+              <a:rPr lang="en-US" sz="2000" b="1" dirty="0" smtClean="0"/>
+              <a:t>-Type </a:t>
+            </a:r>
+            <a:r>
+              <a:rPr lang="en-US" sz="2000" b="1" dirty="0" smtClean="0"/>
+              <a:t>of JavaScript/CSS</a:t>
+            </a:r>
+          </a:p>
+        </p:txBody>
+      </p:sp>
+      <p:sp>
+        <p:nvSpPr>
+          <p:cNvPr id="10" name="TextBox 9"/>
+          <p:cNvSpPr txBox="1"/>
+          <p:nvPr/>
+        </p:nvSpPr>
+        <p:spPr>
+          <a:xfrm>
+            <a:off x="1714480" y="4143380"/>
+            <a:ext cx="4143404" cy="400110"/>
+          </a:xfrm>
+          <a:prstGeom prst="rect">
+            <a:avLst/>
+          </a:prstGeom>
+          <a:noFill/>
+        </p:spPr>
+        <p:txBody>
+          <a:bodyPr wrap="square" rtlCol="0">
+            <a:spAutoFit/>
+          </a:bodyPr>
+          <a:lstStyle/>
+          <a:p>
+            <a:pPr lvl="1"/>
+            <a:r>
+              <a:rPr lang="en-US" sz="2000" b="1" dirty="0" smtClean="0"/>
+              <a:t>-Caching, etc…</a:t>
+            </a:r>
+            <a:endParaRPr lang="en-US" sz="2000" b="1" dirty="0" smtClean="0"/>
+          </a:p>
+        </p:txBody>
+      </p:sp>
+    </p:spTree>
+  </p:cSld>
+  <p:clrMapOvr>
+    <a:masterClrMapping/>
+  </p:clrMapOvr>
+  <p:timing>
+    <p:tnLst>
+      <p:par>
+        <p:cTn id="1" dur="indefinite" restart="never" nodeType="tmRoot">
+          <p:childTnLst>
+            <p:seq concurrent="1" nextAc="seek">
+              <p:cTn id="2" dur="indefinite" nodeType="mainSeq">
+                <p:childTnLst>
+                  <p:par>
+                    <p:cTn id="3" fill="hold">
+                      <p:stCondLst>
+                        <p:cond delay="indefinite"/>
+                      </p:stCondLst>
+                      <p:childTnLst>
+                        <p:par>
+                          <p:cTn id="4" fill="hold">
+                            <p:stCondLst>
+                              <p:cond delay="0"/>
+                            </p:stCondLst>
+                            <p:childTnLst>
+                              <p:par>
+                                <p:cTn id="5" presetID="54" presetClass="entr" presetSubtype="0" accel="100000" fill="hold" grpId="0" nodeType="clickEffect">
+                                  <p:stCondLst>
+                                    <p:cond delay="0"/>
+                                  </p:stCondLst>
+                                  <p:childTnLst>
+                                    <p:set>
+                                      <p:cBhvr>
+                                        <p:cTn id="6" dur="1" fill="hold">
+                                          <p:stCondLst>
+                                            <p:cond delay="0"/>
+                                          </p:stCondLst>
+                                        </p:cTn>
+                                        <p:tgtEl>
+                                          <p:spTgt spid="3">
+                                            <p:txEl>
+                                              <p:pRg st="0" end="0"/>
+                                            </p:txEl>
+                                          </p:spTgt>
+                                        </p:tgtEl>
+                                        <p:attrNameLst>
+                                          <p:attrName>style.visibility</p:attrName>
+                                        </p:attrNameLst>
+                                      </p:cBhvr>
+                                      <p:to>
+                                        <p:strVal val="visible"/>
+                                      </p:to>
+                                    </p:set>
+                                    <p:anim calcmode="lin" valueType="num">
+                                      <p:cBhvr>
+                                        <p:cTn id="7" dur="500" fill="hold"/>
+                                        <p:tgtEl>
+                                          <p:spTgt spid="3">
+                                            <p:txEl>
+                                              <p:pRg st="0" end="0"/>
+                                            </p:txEl>
+                                          </p:spTgt>
+                                        </p:tgtEl>
+                                        <p:attrNameLst>
+                                          <p:attrName>ppt_w</p:attrName>
+                                        </p:attrNameLst>
+                                      </p:cBhvr>
+                                      <p:tavLst>
+                                        <p:tav tm="0">
+                                          <p:val>
+                                            <p:strVal val="#ppt_w*0.05"/>
+                                          </p:val>
+                                        </p:tav>
+                                        <p:tav tm="100000">
+                                          <p:val>
+                                            <p:strVal val="#ppt_w"/>
+                                          </p:val>
+                                        </p:tav>
+                                      </p:tavLst>
+                                    </p:anim>
+                                    <p:anim calcmode="lin" valueType="num">
+                                      <p:cBhvr>
+                                        <p:cTn id="8" dur="500" fill="hold"/>
+                                        <p:tgtEl>
+                                          <p:spTgt spid="3">
+                                            <p:txEl>
+                                              <p:pRg st="0" end="0"/>
+                                            </p:txEl>
+                                          </p:spTgt>
+                                        </p:tgtEl>
+                                        <p:attrNameLst>
+                                          <p:attrName>ppt_h</p:attrName>
+                                        </p:attrNameLst>
+                                      </p:cBhvr>
+                                      <p:tavLst>
+                                        <p:tav tm="0">
+                                          <p:val>
+                                            <p:strVal val="#ppt_h"/>
+                                          </p:val>
+                                        </p:tav>
+                                        <p:tav tm="100000">
+                                          <p:val>
+                                            <p:strVal val="#ppt_h"/>
+                                          </p:val>
+                                        </p:tav>
+                                      </p:tavLst>
+                                    </p:anim>
+                                    <p:anim calcmode="lin" valueType="num">
+                                      <p:cBhvr>
+                                        <p:cTn id="9" dur="500" fill="hold"/>
+                                        <p:tgtEl>
+                                          <p:spTgt spid="3">
+                                            <p:txEl>
+                                              <p:pRg st="0" end="0"/>
+                                            </p:txEl>
+                                          </p:spTgt>
+                                        </p:tgtEl>
+                                        <p:attrNameLst>
+                                          <p:attrName>ppt_x</p:attrName>
+                                        </p:attrNameLst>
+                                      </p:cBhvr>
+                                      <p:tavLst>
+                                        <p:tav tm="0">
+                                          <p:val>
+                                            <p:strVal val="#ppt_x-.2"/>
+                                          </p:val>
+                                        </p:tav>
+                                        <p:tav tm="100000">
+                                          <p:val>
+                                            <p:strVal val="#ppt_x"/>
+                                          </p:val>
+                                        </p:tav>
+                                      </p:tavLst>
+                                    </p:anim>
+                                    <p:anim calcmode="lin" valueType="num">
+                                      <p:cBhvr>
+                                        <p:cTn id="10" dur="500" fill="hold"/>
+                                        <p:tgtEl>
+                                          <p:spTgt spid="3">
+                                            <p:txEl>
+                                              <p:pRg st="0" end="0"/>
+                                            </p:txEl>
+                                          </p:spTgt>
+                                        </p:tgtEl>
+                                        <p:attrNameLst>
+                                          <p:attrName>ppt_y</p:attrName>
+                                        </p:attrNameLst>
+                                      </p:cBhvr>
+                                      <p:tavLst>
+                                        <p:tav tm="0">
+                                          <p:val>
+                                            <p:strVal val="#ppt_y"/>
+                                          </p:val>
+                                        </p:tav>
+                                        <p:tav tm="100000">
+                                          <p:val>
+                                            <p:strVal val="#ppt_y"/>
+                                          </p:val>
+                                        </p:tav>
+                                      </p:tavLst>
+                                    </p:anim>
+                                    <p:animEffect transition="in" filter="fade">
+                                      <p:cBhvr>
+                                        <p:cTn id="11" dur="500"/>
+                                        <p:tgtEl>
+                                          <p:spTgt spid="3">
+                                            <p:txEl>
+                                              <p:pRg st="0" end="0"/>
+                                            </p:txEl>
+                                          </p:spTgt>
+                                        </p:tgtEl>
+                                      </p:cBhvr>
+                                    </p:animEffect>
+                                  </p:childTnLst>
+                                </p:cTn>
+                              </p:par>
+                            </p:childTnLst>
+                          </p:cTn>
+                        </p:par>
+                      </p:childTnLst>
+                    </p:cTn>
+                  </p:par>
+                  <p:par>
+                    <p:cTn id="12" fill="hold">
+                      <p:stCondLst>
+                        <p:cond delay="indefinite"/>
+                      </p:stCondLst>
+                      <p:childTnLst>
+                        <p:par>
+                          <p:cTn id="13" fill="hold">
+                            <p:stCondLst>
+                              <p:cond delay="0"/>
+                            </p:stCondLst>
+                            <p:childTnLst>
+                              <p:par>
+                                <p:cTn id="14" presetID="2" presetClass="entr" presetSubtype="8" fill="hold" grpId="0" nodeType="clickEffect">
+                                  <p:stCondLst>
+                                    <p:cond delay="0"/>
+                                  </p:stCondLst>
+                                  <p:childTnLst>
+                                    <p:set>
+                                      <p:cBhvr>
+                                        <p:cTn id="15" dur="1" fill="hold">
+                                          <p:stCondLst>
+                                            <p:cond delay="0"/>
+                                          </p:stCondLst>
+                                        </p:cTn>
+                                        <p:tgtEl>
+                                          <p:spTgt spid="8"/>
+                                        </p:tgtEl>
+                                        <p:attrNameLst>
+                                          <p:attrName>style.visibility</p:attrName>
+                                        </p:attrNameLst>
+                                      </p:cBhvr>
+                                      <p:to>
+                                        <p:strVal val="visible"/>
+                                      </p:to>
+                                    </p:set>
+                                    <p:anim calcmode="lin" valueType="num">
+                                      <p:cBhvr additive="base">
+                                        <p:cTn id="16" dur="500" fill="hold"/>
+                                        <p:tgtEl>
+                                          <p:spTgt spid="8"/>
+                                        </p:tgtEl>
+                                        <p:attrNameLst>
+                                          <p:attrName>ppt_x</p:attrName>
+                                        </p:attrNameLst>
+                                      </p:cBhvr>
+                                      <p:tavLst>
+                                        <p:tav tm="0">
+                                          <p:val>
+                                            <p:strVal val="0-#ppt_w/2"/>
+                                          </p:val>
+                                        </p:tav>
+                                        <p:tav tm="100000">
+                                          <p:val>
+                                            <p:strVal val="#ppt_x"/>
+                                          </p:val>
+                                        </p:tav>
+                                      </p:tavLst>
+                                    </p:anim>
+                                    <p:anim calcmode="lin" valueType="num">
+                                      <p:cBhvr additive="base">
+                                        <p:cTn id="17" dur="500" fill="hold"/>
+                                        <p:tgtEl>
+                                          <p:spTgt spid="8"/>
+                                        </p:tgtEl>
+                                        <p:attrNameLst>
+                                          <p:attrName>ppt_y</p:attrName>
+                                        </p:attrNameLst>
+                                      </p:cBhvr>
+                                      <p:tavLst>
+                                        <p:tav tm="0">
+                                          <p:val>
+                                            <p:strVal val="#ppt_y"/>
+                                          </p:val>
+                                        </p:tav>
+                                        <p:tav tm="100000">
+                                          <p:val>
+                                            <p:strVal val="#ppt_y"/>
+                                          </p:val>
+                                        </p:tav>
+                                      </p:tavLst>
+                                    </p:anim>
+                                  </p:childTnLst>
+                                </p:cTn>
+                              </p:par>
+                              <p:par>
+                                <p:cTn id="18" presetID="2" presetClass="entr" presetSubtype="8" fill="hold" nodeType="withEffect">
+                                  <p:stCondLst>
+                                    <p:cond delay="0"/>
+                                  </p:stCondLst>
+                                  <p:childTnLst>
+                                    <p:set>
+                                      <p:cBhvr>
+                                        <p:cTn id="19" dur="1" fill="hold">
+                                          <p:stCondLst>
+                                            <p:cond delay="0"/>
+                                          </p:stCondLst>
+                                        </p:cTn>
+                                        <p:tgtEl>
+                                          <p:spTgt spid="5"/>
+                                        </p:tgtEl>
+                                        <p:attrNameLst>
+                                          <p:attrName>style.visibility</p:attrName>
+                                        </p:attrNameLst>
+                                      </p:cBhvr>
+                                      <p:to>
+                                        <p:strVal val="visible"/>
+                                      </p:to>
+                                    </p:set>
+                                    <p:anim calcmode="lin" valueType="num">
+                                      <p:cBhvr additive="base">
+                                        <p:cTn id="20" dur="500" fill="hold"/>
+                                        <p:tgtEl>
+                                          <p:spTgt spid="5"/>
+                                        </p:tgtEl>
+                                        <p:attrNameLst>
+                                          <p:attrName>ppt_x</p:attrName>
+                                        </p:attrNameLst>
+                                      </p:cBhvr>
+                                      <p:tavLst>
+                                        <p:tav tm="0">
+                                          <p:val>
+                                            <p:strVal val="0-#ppt_w/2"/>
+                                          </p:val>
+                                        </p:tav>
+                                        <p:tav tm="100000">
+                                          <p:val>
+                                            <p:strVal val="#ppt_x"/>
+                                          </p:val>
+                                        </p:tav>
+                                      </p:tavLst>
+                                    </p:anim>
+                                    <p:anim calcmode="lin" valueType="num">
+                                      <p:cBhvr additive="base">
+                                        <p:cTn id="21" dur="500" fill="hold"/>
+                                        <p:tgtEl>
+                                          <p:spTgt spid="5"/>
+                                        </p:tgtEl>
+                                        <p:attrNameLst>
+                                          <p:attrName>ppt_y</p:attrName>
+                                        </p:attrNameLst>
+                                      </p:cBhvr>
+                                      <p:tavLst>
+                                        <p:tav tm="0">
+                                          <p:val>
+                                            <p:strVal val="#ppt_y"/>
+                                          </p:val>
+                                        </p:tav>
+                                        <p:tav tm="100000">
+                                          <p:val>
+                                            <p:strVal val="#ppt_y"/>
+                                          </p:val>
+                                        </p:tav>
+                                      </p:tavLst>
+                                    </p:anim>
+                                  </p:childTnLst>
+                                </p:cTn>
+                              </p:par>
+                            </p:childTnLst>
+                          </p:cTn>
+                        </p:par>
+                      </p:childTnLst>
+                    </p:cTn>
+                  </p:par>
+                  <p:par>
+                    <p:cTn id="22" fill="hold">
+                      <p:stCondLst>
+                        <p:cond delay="indefinite"/>
+                      </p:stCondLst>
+                      <p:childTnLst>
+                        <p:par>
+                          <p:cTn id="23" fill="hold">
+                            <p:stCondLst>
+                              <p:cond delay="0"/>
+                            </p:stCondLst>
+                            <p:childTnLst>
+                              <p:par>
+                                <p:cTn id="24" presetID="2" presetClass="entr" presetSubtype="4" fill="hold" grpId="0" nodeType="clickEffect">
+                                  <p:stCondLst>
+                                    <p:cond delay="0"/>
+                                  </p:stCondLst>
+                                  <p:childTnLst>
+                                    <p:set>
+                                      <p:cBhvr>
+                                        <p:cTn id="25" dur="1" fill="hold">
+                                          <p:stCondLst>
+                                            <p:cond delay="0"/>
+                                          </p:stCondLst>
+                                        </p:cTn>
+                                        <p:tgtEl>
+                                          <p:spTgt spid="9"/>
+                                        </p:tgtEl>
+                                        <p:attrNameLst>
+                                          <p:attrName>style.visibility</p:attrName>
+                                        </p:attrNameLst>
+                                      </p:cBhvr>
+                                      <p:to>
+                                        <p:strVal val="visible"/>
+                                      </p:to>
+                                    </p:set>
+                                    <p:anim calcmode="lin" valueType="num">
+                                      <p:cBhvr additive="base">
+                                        <p:cTn id="26" dur="500" fill="hold"/>
+                                        <p:tgtEl>
+                                          <p:spTgt spid="9"/>
+                                        </p:tgtEl>
+                                        <p:attrNameLst>
+                                          <p:attrName>ppt_x</p:attrName>
+                                        </p:attrNameLst>
+                                      </p:cBhvr>
+                                      <p:tavLst>
+                                        <p:tav tm="0">
+                                          <p:val>
+                                            <p:strVal val="#ppt_x"/>
+                                          </p:val>
+                                        </p:tav>
+                                        <p:tav tm="100000">
+                                          <p:val>
+                                            <p:strVal val="#ppt_x"/>
+                                          </p:val>
+                                        </p:tav>
+                                      </p:tavLst>
+                                    </p:anim>
+                                    <p:anim calcmode="lin" valueType="num">
+                                      <p:cBhvr additive="base">
+                                        <p:cTn id="27" dur="500" fill="hold"/>
+                                        <p:tgtEl>
+                                          <p:spTgt spid="9"/>
+                                        </p:tgtEl>
+                                        <p:attrNameLst>
+                                          <p:attrName>ppt_y</p:attrName>
+                                        </p:attrNameLst>
+                                      </p:cBhvr>
+                                      <p:tavLst>
+                                        <p:tav tm="0">
+                                          <p:val>
+                                            <p:strVal val="1+#ppt_h/2"/>
+                                          </p:val>
+                                        </p:tav>
+                                        <p:tav tm="100000">
+                                          <p:val>
+                                            <p:strVal val="#ppt_y"/>
+                                          </p:val>
+                                        </p:tav>
+                                      </p:tavLst>
+                                    </p:anim>
+                                  </p:childTnLst>
+                                </p:cTn>
+                              </p:par>
+                              <p:par>
+                                <p:cTn id="28" presetID="2" presetClass="entr" presetSubtype="4" fill="hold" nodeType="withEffect">
+                                  <p:stCondLst>
+                                    <p:cond delay="0"/>
+                                  </p:stCondLst>
+                                  <p:childTnLst>
+                                    <p:set>
+                                      <p:cBhvr>
+                                        <p:cTn id="29" dur="1" fill="hold">
+                                          <p:stCondLst>
+                                            <p:cond delay="0"/>
+                                          </p:stCondLst>
+                                        </p:cTn>
+                                        <p:tgtEl>
+                                          <p:spTgt spid="6"/>
+                                        </p:tgtEl>
+                                        <p:attrNameLst>
+                                          <p:attrName>style.visibility</p:attrName>
+                                        </p:attrNameLst>
+                                      </p:cBhvr>
+                                      <p:to>
+                                        <p:strVal val="visible"/>
+                                      </p:to>
+                                    </p:set>
+                                    <p:anim calcmode="lin" valueType="num">
+                                      <p:cBhvr additive="base">
+                                        <p:cTn id="30" dur="500" fill="hold"/>
+                                        <p:tgtEl>
+                                          <p:spTgt spid="6"/>
+                                        </p:tgtEl>
+                                        <p:attrNameLst>
+                                          <p:attrName>ppt_x</p:attrName>
+                                        </p:attrNameLst>
+                                      </p:cBhvr>
+                                      <p:tavLst>
+                                        <p:tav tm="0">
+                                          <p:val>
+                                            <p:strVal val="#ppt_x"/>
+                                          </p:val>
+                                        </p:tav>
+                                        <p:tav tm="100000">
+                                          <p:val>
+                                            <p:strVal val="#ppt_x"/>
+                                          </p:val>
+                                        </p:tav>
+                                      </p:tavLst>
+                                    </p:anim>
+                                    <p:anim calcmode="lin" valueType="num">
+                                      <p:cBhvr additive="base">
+                                        <p:cTn id="31" dur="500" fill="hold"/>
+                                        <p:tgtEl>
+                                          <p:spTgt spid="6"/>
+                                        </p:tgtEl>
+                                        <p:attrNameLst>
+                                          <p:attrName>ppt_y</p:attrName>
+                                        </p:attrNameLst>
+                                      </p:cBhvr>
+                                      <p:tavLst>
+                                        <p:tav tm="0">
+                                          <p:val>
+                                            <p:strVal val="1+#ppt_h/2"/>
+                                          </p:val>
+                                        </p:tav>
+                                        <p:tav tm="100000">
+                                          <p:val>
+                                            <p:strVal val="#ppt_y"/>
+                                          </p:val>
+                                        </p:tav>
+                                      </p:tavLst>
+                                    </p:anim>
+                                  </p:childTnLst>
+                                </p:cTn>
+                              </p:par>
+                            </p:childTnLst>
+                          </p:cTn>
+                        </p:par>
+                      </p:childTnLst>
+                    </p:cTn>
+                  </p:par>
+                  <p:par>
+                    <p:cTn id="32" fill="hold">
+                      <p:stCondLst>
+                        <p:cond delay="indefinite"/>
+                      </p:stCondLst>
+                      <p:childTnLst>
+                        <p:par>
+                          <p:cTn id="33" fill="hold">
+                            <p:stCondLst>
+                              <p:cond delay="0"/>
+                            </p:stCondLst>
+                            <p:childTnLst>
+                              <p:par>
+                                <p:cTn id="34" presetID="2" presetClass="entr" presetSubtype="2" fill="hold" grpId="0" nodeType="clickEffect">
+                                  <p:stCondLst>
+                                    <p:cond delay="0"/>
+                                  </p:stCondLst>
+                                  <p:childTnLst>
+                                    <p:set>
+                                      <p:cBhvr>
+                                        <p:cTn id="35" dur="1" fill="hold">
+                                          <p:stCondLst>
+                                            <p:cond delay="0"/>
+                                          </p:stCondLst>
+                                        </p:cTn>
+                                        <p:tgtEl>
+                                          <p:spTgt spid="10"/>
+                                        </p:tgtEl>
+                                        <p:attrNameLst>
+                                          <p:attrName>style.visibility</p:attrName>
+                                        </p:attrNameLst>
+                                      </p:cBhvr>
+                                      <p:to>
+                                        <p:strVal val="visible"/>
+                                      </p:to>
+                                    </p:set>
+                                    <p:anim calcmode="lin" valueType="num">
+                                      <p:cBhvr additive="base">
+                                        <p:cTn id="36" dur="500" fill="hold"/>
+                                        <p:tgtEl>
+                                          <p:spTgt spid="10"/>
+                                        </p:tgtEl>
+                                        <p:attrNameLst>
+                                          <p:attrName>ppt_x</p:attrName>
+                                        </p:attrNameLst>
+                                      </p:cBhvr>
+                                      <p:tavLst>
+                                        <p:tav tm="0">
+                                          <p:val>
+                                            <p:strVal val="1+#ppt_w/2"/>
+                                          </p:val>
+                                        </p:tav>
+                                        <p:tav tm="100000">
+                                          <p:val>
+                                            <p:strVal val="#ppt_x"/>
+                                          </p:val>
+                                        </p:tav>
+                                      </p:tavLst>
+                                    </p:anim>
+                                    <p:anim calcmode="lin" valueType="num">
+                                      <p:cBhvr additive="base">
+                                        <p:cTn id="37" dur="500" fill="hold"/>
+                                        <p:tgtEl>
+                                          <p:spTgt spid="10"/>
+                                        </p:tgtEl>
+                                        <p:attrNameLst>
+                                          <p:attrName>ppt_y</p:attrName>
+                                        </p:attrNameLst>
+                                      </p:cBhvr>
+                                      <p:tavLst>
+                                        <p:tav tm="0">
+                                          <p:val>
+                                            <p:strVal val="#ppt_y"/>
+                                          </p:val>
+                                        </p:tav>
+                                        <p:tav tm="100000">
+                                          <p:val>
+                                            <p:strVal val="#ppt_y"/>
+                                          </p:val>
+                                        </p:tav>
+                                      </p:tavLst>
+                                    </p:anim>
+                                  </p:childTnLst>
+                                </p:cTn>
+                              </p:par>
+                              <p:par>
+                                <p:cTn id="38" presetID="2" presetClass="entr" presetSubtype="2" fill="hold" nodeType="withEffect">
+                                  <p:stCondLst>
+                                    <p:cond delay="0"/>
+                                  </p:stCondLst>
+                                  <p:childTnLst>
+                                    <p:set>
+                                      <p:cBhvr>
+                                        <p:cTn id="39" dur="1" fill="hold">
+                                          <p:stCondLst>
+                                            <p:cond delay="0"/>
+                                          </p:stCondLst>
+                                        </p:cTn>
+                                        <p:tgtEl>
+                                          <p:spTgt spid="7"/>
+                                        </p:tgtEl>
+                                        <p:attrNameLst>
+                                          <p:attrName>style.visibility</p:attrName>
+                                        </p:attrNameLst>
+                                      </p:cBhvr>
+                                      <p:to>
+                                        <p:strVal val="visible"/>
+                                      </p:to>
+                                    </p:set>
+                                    <p:anim calcmode="lin" valueType="num">
+                                      <p:cBhvr additive="base">
+                                        <p:cTn id="40" dur="500" fill="hold"/>
+                                        <p:tgtEl>
+                                          <p:spTgt spid="7"/>
+                                        </p:tgtEl>
+                                        <p:attrNameLst>
+                                          <p:attrName>ppt_x</p:attrName>
+                                        </p:attrNameLst>
+                                      </p:cBhvr>
+                                      <p:tavLst>
+                                        <p:tav tm="0">
+                                          <p:val>
+                                            <p:strVal val="1+#ppt_w/2"/>
+                                          </p:val>
+                                        </p:tav>
+                                        <p:tav tm="100000">
+                                          <p:val>
+                                            <p:strVal val="#ppt_x"/>
+                                          </p:val>
+                                        </p:tav>
+                                      </p:tavLst>
+                                    </p:anim>
+                                    <p:anim calcmode="lin" valueType="num">
+                                      <p:cBhvr additive="base">
+                                        <p:cTn id="41" dur="500" fill="hold"/>
+                                        <p:tgtEl>
+                                          <p:spTgt spid="7"/>
+                                        </p:tgtEl>
+                                        <p:attrNameLst>
+                                          <p:attrName>ppt_y</p:attrName>
+                                        </p:attrNameLst>
+                                      </p:cBhvr>
+                                      <p:tavLst>
+                                        <p:tav tm="0">
+                                          <p:val>
+                                            <p:strVal val="#ppt_y"/>
+                                          </p:val>
+                                        </p:tav>
+                                        <p:tav tm="100000">
+                                          <p:val>
+                                            <p:strVal val="#ppt_y"/>
+                                          </p:val>
+                                        </p:tav>
+                                      </p:tavLst>
+                                    </p:anim>
+                                  </p:childTnLst>
+                                </p:cTn>
+                              </p:par>
+                            </p:childTnLst>
+                          </p:cTn>
+                        </p:par>
+                      </p:childTnLst>
+                    </p:cTn>
+                  </p:par>
+                </p:childTnLst>
+              </p:cTn>
+              <p:prevCondLst>
+                <p:cond evt="onPrev" delay="0">
+                  <p:tgtEl>
+                    <p:sldTgt/>
+                  </p:tgtEl>
+                </p:cond>
+              </p:prevCondLst>
+              <p:nextCondLst>
+                <p:cond evt="onNext" delay="0">
+                  <p:tgtEl>
+                    <p:sldTgt/>
+                  </p:tgtEl>
+                </p:cond>
+              </p:nextCondLst>
+            </p:seq>
+          </p:childTnLst>
+        </p:cTn>
+      </p:par>
+    </p:tnLst>
+    <p:bldLst>
+      <p:bldP spid="3" grpId="0" build="p"/>
+      <p:bldP spid="8" grpId="0"/>
+      <p:bldP spid="9" grpId="0"/>
+      <p:bldP spid="10" grpId="0"/>
+    </p:bldLst>
+  </p:timing>
+</p:sld>
+</file>
+
+<file path=ppt/slides/slide6.xml><?xml version="1.0" encoding="utf-8"?>
+<p:sld xmlns:a="http://schemas.openxmlformats.org/drawingml/2006/main" xmlns:r="http://schemas.openxmlformats.org/officeDocument/2006/relationships" xmlns:p="http://schemas.openxmlformats.org/presentationml/2006/main">
+  <p:cSld>
+    <p:spTree>
+      <p:nvGrpSpPr>
+        <p:cNvPr id="1" name=""/>
+        <p:cNvGrpSpPr/>
+        <p:nvPr/>
+      </p:nvGrpSpPr>
+      <p:grpSpPr>
+        <a:xfrm>
+          <a:off x="0" y="0"/>
+          <a:ext cx="0" cy="0"/>
+          <a:chOff x="0" y="0"/>
+          <a:chExt cx="0" cy="0"/>
+        </a:xfrm>
+      </p:grpSpPr>
+      <p:sp>
+        <p:nvSpPr>
           <p:cNvPr id="2" name="Title 1"/>
           <p:cNvSpPr>
             <a:spLocks noGrp="1"/>
@@ -7503,8 +10614,13 @@
             </a:pPr>
             <a:r>
               <a:rPr lang="en-US" sz="1400" dirty="0" smtClean="0"/>
-              <a:t>BeautifulSoup package present Python</a:t>
-            </a:r>
+              <a:t>BeautifulSoup package present </a:t>
+            </a:r>
+            <a:r>
+              <a:rPr lang="en-US" sz="1400" dirty="0" smtClean="0"/>
+              <a:t>in Python</a:t>
+            </a:r>
+            <a:endParaRPr lang="en-US" sz="1400" dirty="0" smtClean="0"/>
           </a:p>
           <a:p>
             <a:endParaRPr lang="en-IN" dirty="0"/>
@@ -9716,7 +12832,245 @@
 </p:sld>
 </file>
 
-<file path=ppt/slides/slide6.xml><?xml version="1.0" encoding="utf-8"?>
+<file path=ppt/slides/slide7.xml><?xml version="1.0" encoding="utf-8"?>
+<p:sld xmlns:a="http://schemas.openxmlformats.org/drawingml/2006/main" xmlns:r="http://schemas.openxmlformats.org/officeDocument/2006/relationships" xmlns:p="http://schemas.openxmlformats.org/presentationml/2006/main">
+  <p:cSld>
+    <p:spTree>
+      <p:nvGrpSpPr>
+        <p:cNvPr id="1" name=""/>
+        <p:cNvGrpSpPr/>
+        <p:nvPr/>
+      </p:nvGrpSpPr>
+      <p:grpSpPr>
+        <a:xfrm>
+          <a:off x="0" y="0"/>
+          <a:ext cx="0" cy="0"/>
+          <a:chOff x="0" y="0"/>
+          <a:chExt cx="0" cy="0"/>
+        </a:xfrm>
+      </p:grpSpPr>
+      <p:sp>
+        <p:nvSpPr>
+          <p:cNvPr id="3" name="Content Placeholder 2"/>
+          <p:cNvSpPr>
+            <a:spLocks noGrp="1"/>
+          </p:cNvSpPr>
+          <p:nvPr>
+            <p:ph idx="1"/>
+          </p:nvPr>
+        </p:nvSpPr>
+        <p:spPr>
+          <a:xfrm>
+            <a:off x="457200" y="1600201"/>
+            <a:ext cx="8229600" cy="1471610"/>
+          </a:xfrm>
+        </p:spPr>
+        <p:txBody>
+          <a:bodyPr>
+            <a:normAutofit/>
+          </a:bodyPr>
+          <a:lstStyle/>
+          <a:p>
+            <a:r>
+              <a:rPr lang="en-US" sz="1800" dirty="0" smtClean="0"/>
+              <a:t>The entire concept for visualization is going to be done by normalizing all the available factors that determine the responsiveness of a website and display it in terms of a spiral plot where the y-axis would be the complexity in percentage and the X-axis would hold the list of website arranged in ascending order of their ranks</a:t>
+            </a:r>
+            <a:endParaRPr lang="en-IN" sz="1800" dirty="0"/>
+          </a:p>
+        </p:txBody>
+      </p:sp>
+      <p:sp>
+        <p:nvSpPr>
+          <p:cNvPr id="5" name="Title 1"/>
+          <p:cNvSpPr txBox="1">
+            <a:spLocks/>
+          </p:cNvSpPr>
+          <p:nvPr/>
+        </p:nvSpPr>
+        <p:spPr>
+          <a:xfrm>
+            <a:off x="457200" y="274638"/>
+            <a:ext cx="8229600" cy="868346"/>
+          </a:xfrm>
+          <a:prstGeom prst="rect">
+            <a:avLst/>
+          </a:prstGeom>
+        </p:spPr>
+        <p:txBody>
+          <a:bodyPr vert="horz" lIns="91440" tIns="45720" rIns="91440" bIns="45720" rtlCol="0" anchor="ctr">
+            <a:normAutofit/>
+          </a:bodyPr>
+          <a:lstStyle/>
+          <a:p>
+            <a:pPr marL="0" marR="0" lvl="0" indent="0" algn="l" defTabSz="914400" rtl="0" eaLnBrk="1" fontAlgn="auto" latinLnBrk="0" hangingPunct="1">
+              <a:lnSpc>
+                <a:spcPct val="100000"/>
+              </a:lnSpc>
+              <a:spcBef>
+                <a:spcPct val="0"/>
+              </a:spcBef>
+              <a:spcAft>
+                <a:spcPts val="0"/>
+              </a:spcAft>
+              <a:buClrTx/>
+              <a:buSzTx/>
+              <a:buFontTx/>
+              <a:buNone/>
+              <a:tabLst/>
+              <a:defRPr/>
+            </a:pPr>
+            <a:r>
+              <a:rPr kumimoji="0" lang="en-US" sz="3600" b="0" i="0" u="none" strike="noStrike" kern="1200" cap="none" spc="0" normalizeH="0" baseline="0" noProof="0" dirty="0" smtClean="0">
+                <a:ln>
+                  <a:noFill/>
+                </a:ln>
+                <a:solidFill>
+                  <a:schemeClr val="tx1"/>
+                </a:solidFill>
+                <a:effectLst/>
+                <a:uLnTx/>
+                <a:uFillTx/>
+                <a:latin typeface="+mj-lt"/>
+                <a:ea typeface="+mj-ea"/>
+                <a:cs typeface="+mj-cs"/>
+              </a:rPr>
+              <a:t>DATA VISUALIZATION</a:t>
+            </a:r>
+            <a:endParaRPr kumimoji="0" lang="en-IN" sz="3600" b="0" i="0" u="none" strike="noStrike" kern="1200" cap="none" spc="0" normalizeH="0" baseline="0" noProof="0" dirty="0">
+              <a:ln>
+                <a:noFill/>
+              </a:ln>
+              <a:solidFill>
+                <a:schemeClr val="tx1"/>
+              </a:solidFill>
+              <a:effectLst/>
+              <a:uLnTx/>
+              <a:uFillTx/>
+              <a:latin typeface="+mj-lt"/>
+              <a:ea typeface="+mj-ea"/>
+              <a:cs typeface="+mj-cs"/>
+            </a:endParaRPr>
+          </a:p>
+        </p:txBody>
+      </p:sp>
+      <p:pic>
+        <p:nvPicPr>
+          <p:cNvPr id="1026" name="Picture 2"/>
+          <p:cNvPicPr>
+            <a:picLocks noChangeAspect="1" noChangeArrowheads="1"/>
+          </p:cNvPicPr>
+          <p:nvPr/>
+        </p:nvPicPr>
+        <p:blipFill>
+          <a:blip r:embed="rId2"/>
+          <a:srcRect/>
+          <a:stretch>
+            <a:fillRect/>
+          </a:stretch>
+        </p:blipFill>
+        <p:spPr bwMode="auto">
+          <a:xfrm>
+            <a:off x="5286380" y="3429000"/>
+            <a:ext cx="3167067" cy="2921081"/>
+          </a:xfrm>
+          <a:prstGeom prst="rect">
+            <a:avLst/>
+          </a:prstGeom>
+          <a:noFill/>
+          <a:ln w="9525">
+            <a:noFill/>
+            <a:miter lim="800000"/>
+            <a:headEnd/>
+            <a:tailEnd/>
+          </a:ln>
+          <a:effectLst/>
+        </p:spPr>
+      </p:pic>
+      <p:sp>
+        <p:nvSpPr>
+          <p:cNvPr id="8" name="TextBox 7"/>
+          <p:cNvSpPr txBox="1"/>
+          <p:nvPr/>
+        </p:nvSpPr>
+        <p:spPr>
+          <a:xfrm>
+            <a:off x="1142976" y="4429132"/>
+            <a:ext cx="3714776" cy="1200329"/>
+          </a:xfrm>
+          <a:prstGeom prst="rect">
+            <a:avLst/>
+          </a:prstGeom>
+          <a:noFill/>
+        </p:spPr>
+        <p:txBody>
+          <a:bodyPr wrap="square" rtlCol="0">
+            <a:spAutoFit/>
+          </a:bodyPr>
+          <a:lstStyle/>
+          <a:p>
+            <a:r>
+              <a:rPr lang="en-US" dirty="0" smtClean="0"/>
+              <a:t>Technologies that will be used are,</a:t>
+            </a:r>
+          </a:p>
+          <a:p>
+            <a:pPr lvl="1">
+              <a:buFont typeface="Arial" pitchFamily="34" charset="0"/>
+              <a:buChar char="•"/>
+            </a:pPr>
+            <a:r>
+              <a:rPr lang="en-US" dirty="0" smtClean="0"/>
+              <a:t> pandas</a:t>
+            </a:r>
+            <a:endParaRPr lang="en-US" dirty="0" smtClean="0"/>
+          </a:p>
+          <a:p>
+            <a:pPr lvl="1">
+              <a:buFont typeface="Arial" pitchFamily="34" charset="0"/>
+              <a:buChar char="•"/>
+            </a:pPr>
+            <a:r>
+              <a:rPr lang="en-US" dirty="0" smtClean="0"/>
+              <a:t> </a:t>
+            </a:r>
+            <a:r>
+              <a:rPr lang="en-US" dirty="0" smtClean="0"/>
+              <a:t>matplotlib</a:t>
+            </a:r>
+          </a:p>
+          <a:p>
+            <a:pPr lvl="1">
+              <a:buFont typeface="Arial" pitchFamily="34" charset="0"/>
+              <a:buChar char="•"/>
+            </a:pPr>
+            <a:r>
+              <a:rPr lang="en-US" dirty="0" smtClean="0"/>
+              <a:t> </a:t>
+            </a:r>
+            <a:r>
+              <a:rPr lang="en-US" dirty="0" smtClean="0"/>
+              <a:t>d3.js</a:t>
+            </a:r>
+            <a:endParaRPr lang="en-IN" dirty="0"/>
+          </a:p>
+        </p:txBody>
+      </p:sp>
+    </p:spTree>
+  </p:cSld>
+  <p:clrMapOvr>
+    <a:masterClrMapping/>
+  </p:clrMapOvr>
+  <p:timing>
+    <p:tnLst>
+      <p:par>
+        <p:cTn id="1" dur="indefinite" restart="never" nodeType="tmRoot"/>
+      </p:par>
+    </p:tnLst>
+  </p:timing>
+</p:sld>
+</file>
+
+<file path=ppt/slides/slide8.xml><?xml version="1.0" encoding="utf-8"?>
 <p:sld xmlns:a="http://schemas.openxmlformats.org/drawingml/2006/main" xmlns:r="http://schemas.openxmlformats.org/officeDocument/2006/relationships" xmlns:p="http://schemas.openxmlformats.org/presentationml/2006/main">
   <p:cSld>
     <p:spTree>
@@ -9743,24 +13097,17 @@
             <p:ph type="title"/>
           </p:nvPr>
         </p:nvSpPr>
-        <p:spPr>
-          <a:xfrm>
-            <a:off x="457200" y="274638"/>
-            <a:ext cx="8229600" cy="868346"/>
-          </a:xfrm>
-        </p:spPr>
+        <p:spPr/>
         <p:txBody>
-          <a:bodyPr>
-            <a:normAutofit/>
-          </a:bodyPr>
+          <a:bodyPr/>
           <a:lstStyle/>
           <a:p>
             <a:pPr algn="l"/>
             <a:r>
-              <a:rPr lang="en-US" sz="3600" dirty="0" smtClean="0"/>
-              <a:t>DATA VISUALIZATION</a:t>
-            </a:r>
-            <a:endParaRPr lang="en-IN" sz="3600" dirty="0"/>
+              <a:rPr lang="en-US" dirty="0" smtClean="0"/>
+              <a:t>Reference</a:t>
+            </a:r>
+            <a:endParaRPr lang="en-IN" dirty="0"/>
           </a:p>
         </p:txBody>
       </p:sp>
@@ -9774,12 +13121,131 @@
             <p:ph idx="1"/>
           </p:nvPr>
         </p:nvSpPr>
-        <p:spPr/>
+        <p:spPr>
+          <a:xfrm>
+            <a:off x="457200" y="1600200"/>
+            <a:ext cx="8229600" cy="4543444"/>
+          </a:xfrm>
+        </p:spPr>
         <p:txBody>
-          <a:bodyPr/>
+          <a:bodyPr>
+            <a:noAutofit/>
+          </a:bodyPr>
           <a:lstStyle/>
           <a:p>
-            <a:endParaRPr lang="en-IN" dirty="0"/>
+            <a:r>
+              <a:rPr lang="en-IN" sz="1400" dirty="0" smtClean="0">
+                <a:hlinkClick r:id="rId2"/>
+              </a:rPr>
+              <a:t>https://gist.github.com/duggalrahul/6548584</a:t>
+            </a:r>
+            <a:endParaRPr lang="en-IN" sz="1400" dirty="0" smtClean="0"/>
+          </a:p>
+          <a:p>
+            <a:r>
+              <a:rPr lang="en-IN" sz="1400" dirty="0" smtClean="0">
+                <a:hlinkClick r:id="rId3"/>
+              </a:rPr>
+              <a:t>http</a:t>
+            </a:r>
+            <a:r>
+              <a:rPr lang="en-IN" sz="1400" dirty="0" smtClean="0">
+                <a:hlinkClick r:id="rId3"/>
+              </a:rPr>
+              <a:t>://www.datavizcatalogue.com/methods/radial_column_chart.html</a:t>
+            </a:r>
+            <a:endParaRPr lang="en-IN" sz="1400" dirty="0" smtClean="0"/>
+          </a:p>
+          <a:p>
+            <a:r>
+              <a:rPr lang="en-IN" sz="1400" dirty="0" smtClean="0">
+                <a:hlinkClick r:id="rId4"/>
+              </a:rPr>
+              <a:t>http</a:t>
+            </a:r>
+            <a:r>
+              <a:rPr lang="en-IN" sz="1400" dirty="0" smtClean="0">
+                <a:hlinkClick r:id="rId4"/>
+              </a:rPr>
+              <a:t>://blog.plot.ly/post/117105992082/time-series-graphs-eleven-stunning-ways-you-can</a:t>
+            </a:r>
+            <a:endParaRPr lang="en-IN" sz="1400" dirty="0" smtClean="0"/>
+          </a:p>
+          <a:p>
+            <a:r>
+              <a:rPr lang="en-IN" sz="1400" dirty="0" smtClean="0">
+                <a:hlinkClick r:id="rId5"/>
+              </a:rPr>
+              <a:t>https</a:t>
+            </a:r>
+            <a:r>
+              <a:rPr lang="en-IN" sz="1400" dirty="0" smtClean="0">
+                <a:hlinkClick r:id="rId5"/>
+              </a:rPr>
+              <a:t>://datavizblog.com/category/data-visualization/</a:t>
+            </a:r>
+            <a:endParaRPr lang="en-IN" sz="1400" dirty="0" smtClean="0"/>
+          </a:p>
+          <a:p>
+            <a:r>
+              <a:rPr lang="en-IN" sz="1400" dirty="0" smtClean="0">
+                <a:hlinkClick r:id="rId6"/>
+              </a:rPr>
+              <a:t>https</a:t>
+            </a:r>
+            <a:r>
+              <a:rPr lang="en-IN" sz="1400" dirty="0" smtClean="0">
+                <a:hlinkClick r:id="rId6"/>
+              </a:rPr>
+              <a:t>://</a:t>
+            </a:r>
+            <a:r>
+              <a:rPr lang="en-IN" sz="1400" dirty="0" smtClean="0">
+                <a:hlinkClick r:id="rId6"/>
+              </a:rPr>
+              <a:t>en.wikipedia.org/wiki/Web_mining</a:t>
+            </a:r>
+            <a:endParaRPr lang="en-IN" sz="1400" dirty="0" smtClean="0"/>
+          </a:p>
+          <a:p>
+            <a:endParaRPr lang="en-US" sz="1400" dirty="0" smtClean="0"/>
+          </a:p>
+          <a:p>
+            <a:pPr>
+              <a:buNone/>
+            </a:pPr>
+            <a:endParaRPr lang="en-US" sz="1400" dirty="0" smtClean="0"/>
+          </a:p>
+          <a:p>
+            <a:pPr>
+              <a:buNone/>
+            </a:pPr>
+            <a:r>
+              <a:rPr lang="en-US" sz="1400" dirty="0" smtClean="0"/>
+              <a:t>Git Repository : </a:t>
+            </a:r>
+          </a:p>
+          <a:p>
+            <a:pPr>
+              <a:buNone/>
+            </a:pPr>
+            <a:endParaRPr lang="en-US" sz="1400" dirty="0" smtClean="0"/>
+          </a:p>
+          <a:p>
+            <a:pPr>
+              <a:buNone/>
+            </a:pPr>
+            <a:r>
+              <a:rPr lang="en-IN" sz="1400" b="1" u="sng" dirty="0" smtClean="0"/>
+              <a:t>https://github.com/nicky1211/Sem1Project</a:t>
+            </a:r>
+            <a:endParaRPr lang="en-IN" sz="1400" b="1" u="sng" dirty="0" smtClean="0"/>
+          </a:p>
+          <a:p>
+            <a:pPr>
+              <a:buNone/>
+            </a:pPr>
+            <a:endParaRPr lang="en-IN" sz="1400" dirty="0"/>
           </a:p>
         </p:txBody>
       </p:sp>
@@ -9788,13 +13254,6 @@
   <p:clrMapOvr>
     <a:masterClrMapping/>
   </p:clrMapOvr>
-  <p:timing>
-    <p:tnLst>
-      <p:par>
-        <p:cTn id="1" dur="indefinite" restart="never" nodeType="tmRoot"/>
-      </p:par>
-    </p:tnLst>
-  </p:timing>
 </p:sld>
 </file>
 

</xml_diff>